<commit_message>
add new ex6 and some changes on presentations
</commit_message>
<xml_diff>
--- a/presentations/mongoDB.pptx
+++ b/presentations/mongoDB.pptx
@@ -5,14 +5,26 @@
     <p:sldMasterId id="2147483660" r:id="rId1"/>
   </p:sldMasterIdLst>
   <p:notesMasterIdLst>
-    <p:notesMasterId r:id="rId7"/>
+    <p:notesMasterId r:id="rId19"/>
   </p:notesMasterIdLst>
   <p:sldIdLst>
     <p:sldId id="256" r:id="rId2"/>
-    <p:sldId id="262" r:id="rId3"/>
-    <p:sldId id="264" r:id="rId4"/>
-    <p:sldId id="263" r:id="rId5"/>
-    <p:sldId id="267" r:id="rId6"/>
+    <p:sldId id="263" r:id="rId3"/>
+    <p:sldId id="270" r:id="rId4"/>
+    <p:sldId id="262" r:id="rId5"/>
+    <p:sldId id="268" r:id="rId6"/>
+    <p:sldId id="269" r:id="rId7"/>
+    <p:sldId id="277" r:id="rId8"/>
+    <p:sldId id="278" r:id="rId9"/>
+    <p:sldId id="273" r:id="rId10"/>
+    <p:sldId id="279" r:id="rId11"/>
+    <p:sldId id="280" r:id="rId12"/>
+    <p:sldId id="281" r:id="rId13"/>
+    <p:sldId id="282" r:id="rId14"/>
+    <p:sldId id="283" r:id="rId15"/>
+    <p:sldId id="274" r:id="rId16"/>
+    <p:sldId id="276" r:id="rId17"/>
+    <p:sldId id="275" r:id="rId18"/>
   </p:sldIdLst>
   <p:sldSz cx="12192000" cy="6858000"/>
   <p:notesSz cx="6858000" cy="9144000"/>
@@ -201,7 +213,7 @@
           <a:p>
             <a:fld id="{40C9EC12-D619-4239-BA0B-F64B757C48A8}" type="datetimeFigureOut">
               <a:rPr lang="bg-BG" smtClean="0"/>
-              <a:t>5.3.2017 г.</a:t>
+              <a:t>9.3.2017 г.</a:t>
             </a:fld>
             <a:endParaRPr lang="bg-BG"/>
           </a:p>
@@ -469,6 +481,246 @@
 </p:notesMaster>
 </file>
 
+<file path=ppt/notesSlides/notesSlide1.xml><?xml version="1.0" encoding="utf-8"?>
+<p:notes xmlns:a="http://schemas.openxmlformats.org/drawingml/2006/main" xmlns:r="http://schemas.openxmlformats.org/officeDocument/2006/relationships" xmlns:p="http://schemas.openxmlformats.org/presentationml/2006/main">
+  <p:cSld>
+    <p:spTree>
+      <p:nvGrpSpPr>
+        <p:cNvPr id="1" name=""/>
+        <p:cNvGrpSpPr/>
+        <p:nvPr/>
+      </p:nvGrpSpPr>
+      <p:grpSpPr>
+        <a:xfrm>
+          <a:off x="0" y="0"/>
+          <a:ext cx="0" cy="0"/>
+          <a:chOff x="0" y="0"/>
+          <a:chExt cx="0" cy="0"/>
+        </a:xfrm>
+      </p:grpSpPr>
+      <p:sp>
+        <p:nvSpPr>
+          <p:cNvPr id="2" name="Slide Image Placeholder 1"/>
+          <p:cNvSpPr>
+            <a:spLocks noGrp="1" noRot="1" noChangeAspect="1"/>
+          </p:cNvSpPr>
+          <p:nvPr>
+            <p:ph type="sldImg"/>
+          </p:nvPr>
+        </p:nvSpPr>
+        <p:spPr/>
+      </p:sp>
+      <p:sp>
+        <p:nvSpPr>
+          <p:cNvPr id="3" name="Notes Placeholder 2"/>
+          <p:cNvSpPr>
+            <a:spLocks noGrp="1"/>
+          </p:cNvSpPr>
+          <p:nvPr>
+            <p:ph type="body" idx="1"/>
+          </p:nvPr>
+        </p:nvSpPr>
+        <p:spPr/>
+        <p:txBody>
+          <a:bodyPr/>
+          <a:lstStyle/>
+          <a:p>
+            <a:pPr fontAlgn="base"/>
+            <a:r>
+              <a:rPr lang="en-US" sz="1200" b="0" i="0" kern="1200" dirty="0" smtClean="0">
+                <a:solidFill>
+                  <a:schemeClr val="tx1"/>
+                </a:solidFill>
+                <a:effectLst/>
+                <a:latin typeface="+mn-lt"/>
+                <a:ea typeface="+mn-ea"/>
+                <a:cs typeface="+mn-cs"/>
+              </a:rPr>
+              <a:t>Key-value stores are the simplest. Every item in the database is stored as an attribute name (or "key") together with its value. </a:t>
+            </a:r>
+            <a:r>
+              <a:rPr lang="en-US" sz="1200" b="0" i="0" kern="1200" dirty="0" err="1" smtClean="0">
+                <a:solidFill>
+                  <a:schemeClr val="tx1"/>
+                </a:solidFill>
+                <a:effectLst/>
+                <a:latin typeface="+mn-lt"/>
+                <a:ea typeface="+mn-ea"/>
+                <a:cs typeface="+mn-cs"/>
+              </a:rPr>
+              <a:t>Riak</a:t>
+            </a:r>
+            <a:r>
+              <a:rPr lang="en-US" sz="1200" b="0" i="0" kern="1200" dirty="0" smtClean="0">
+                <a:solidFill>
+                  <a:schemeClr val="tx1"/>
+                </a:solidFill>
+                <a:effectLst/>
+                <a:latin typeface="+mn-lt"/>
+                <a:ea typeface="+mn-ea"/>
+                <a:cs typeface="+mn-cs"/>
+              </a:rPr>
+              <a:t>, Voldemort, and </a:t>
+            </a:r>
+            <a:r>
+              <a:rPr lang="en-US" sz="1200" b="0" i="0" kern="1200" dirty="0" err="1" smtClean="0">
+                <a:solidFill>
+                  <a:schemeClr val="tx1"/>
+                </a:solidFill>
+                <a:effectLst/>
+                <a:latin typeface="+mn-lt"/>
+                <a:ea typeface="+mn-ea"/>
+                <a:cs typeface="+mn-cs"/>
+              </a:rPr>
+              <a:t>Redis</a:t>
+            </a:r>
+            <a:r>
+              <a:rPr lang="en-US" sz="1200" b="0" i="0" kern="1200" dirty="0" smtClean="0">
+                <a:solidFill>
+                  <a:schemeClr val="tx1"/>
+                </a:solidFill>
+                <a:effectLst/>
+                <a:latin typeface="+mn-lt"/>
+                <a:ea typeface="+mn-ea"/>
+                <a:cs typeface="+mn-cs"/>
+              </a:rPr>
+              <a:t> are the most well-known in this category.</a:t>
+            </a:r>
+          </a:p>
+          <a:p>
+            <a:pPr fontAlgn="base"/>
+            <a:r>
+              <a:rPr lang="en-US" sz="1200" b="0" i="0" kern="1200" dirty="0" smtClean="0">
+                <a:solidFill>
+                  <a:schemeClr val="tx1"/>
+                </a:solidFill>
+                <a:effectLst/>
+                <a:latin typeface="+mn-lt"/>
+                <a:ea typeface="+mn-ea"/>
+                <a:cs typeface="+mn-cs"/>
+              </a:rPr>
+              <a:t>Wide-column stores store data together as columns instead of rows and are optimized for queries over large datasets. The most popular are Cassandra and </a:t>
+            </a:r>
+            <a:r>
+              <a:rPr lang="en-US" sz="1200" b="0" i="0" kern="1200" dirty="0" err="1" smtClean="0">
+                <a:solidFill>
+                  <a:schemeClr val="tx1"/>
+                </a:solidFill>
+                <a:effectLst/>
+                <a:latin typeface="+mn-lt"/>
+                <a:ea typeface="+mn-ea"/>
+                <a:cs typeface="+mn-cs"/>
+              </a:rPr>
+              <a:t>HBase</a:t>
+            </a:r>
+            <a:r>
+              <a:rPr lang="en-US" sz="1200" b="0" i="0" kern="1200" dirty="0" smtClean="0">
+                <a:solidFill>
+                  <a:schemeClr val="tx1"/>
+                </a:solidFill>
+                <a:effectLst/>
+                <a:latin typeface="+mn-lt"/>
+                <a:ea typeface="+mn-ea"/>
+                <a:cs typeface="+mn-cs"/>
+              </a:rPr>
+              <a:t>.</a:t>
+            </a:r>
+          </a:p>
+          <a:p>
+            <a:pPr fontAlgn="base"/>
+            <a:r>
+              <a:rPr lang="en-US" sz="1200" b="0" i="0" kern="1200" dirty="0" smtClean="0">
+                <a:solidFill>
+                  <a:schemeClr val="tx1"/>
+                </a:solidFill>
+                <a:effectLst/>
+                <a:latin typeface="+mn-lt"/>
+                <a:ea typeface="+mn-ea"/>
+                <a:cs typeface="+mn-cs"/>
+              </a:rPr>
+              <a:t>Document databases pair each key with a complex data structure known as a document. Documents can contain many different key-value pairs, or key-array pairs, or even nested documents. MongoDB is the most popular of these databases.</a:t>
+            </a:r>
+          </a:p>
+          <a:p>
+            <a:pPr fontAlgn="base"/>
+            <a:r>
+              <a:rPr lang="en-US" sz="1200" b="0" i="0" kern="1200" dirty="0" smtClean="0">
+                <a:solidFill>
+                  <a:schemeClr val="tx1"/>
+                </a:solidFill>
+                <a:effectLst/>
+                <a:latin typeface="+mn-lt"/>
+                <a:ea typeface="+mn-ea"/>
+                <a:cs typeface="+mn-cs"/>
+              </a:rPr>
+              <a:t>Graph databases are used to store information about networks, such as social connections. Examples are Neo4J and </a:t>
+            </a:r>
+            <a:r>
+              <a:rPr lang="en-US" sz="1200" b="0" i="0" kern="1200" dirty="0" err="1" smtClean="0">
+                <a:solidFill>
+                  <a:schemeClr val="tx1"/>
+                </a:solidFill>
+                <a:effectLst/>
+                <a:latin typeface="+mn-lt"/>
+                <a:ea typeface="+mn-ea"/>
+                <a:cs typeface="+mn-cs"/>
+              </a:rPr>
+              <a:t>HyperGraphDB</a:t>
+            </a:r>
+            <a:r>
+              <a:rPr lang="en-US" sz="1200" b="0" i="0" kern="1200" smtClean="0">
+                <a:solidFill>
+                  <a:schemeClr val="tx1"/>
+                </a:solidFill>
+                <a:effectLst/>
+                <a:latin typeface="+mn-lt"/>
+                <a:ea typeface="+mn-ea"/>
+                <a:cs typeface="+mn-cs"/>
+              </a:rPr>
+              <a:t>.</a:t>
+            </a:r>
+          </a:p>
+          <a:p>
+            <a:endParaRPr lang="bg-BG"/>
+          </a:p>
+        </p:txBody>
+      </p:sp>
+      <p:sp>
+        <p:nvSpPr>
+          <p:cNvPr id="4" name="Slide Number Placeholder 3"/>
+          <p:cNvSpPr>
+            <a:spLocks noGrp="1"/>
+          </p:cNvSpPr>
+          <p:nvPr>
+            <p:ph type="sldNum" sz="quarter" idx="10"/>
+          </p:nvPr>
+        </p:nvSpPr>
+        <p:spPr/>
+        <p:txBody>
+          <a:bodyPr/>
+          <a:lstStyle/>
+          <a:p>
+            <a:fld id="{52B7F6F4-ECB0-4FA5-B3FD-41E3D15A4260}" type="slidenum">
+              <a:rPr lang="bg-BG" smtClean="0"/>
+              <a:t>3</a:t>
+            </a:fld>
+            <a:endParaRPr lang="bg-BG"/>
+          </a:p>
+        </p:txBody>
+      </p:sp>
+    </p:spTree>
+    <p:extLst>
+      <p:ext uri="{BB962C8B-B14F-4D97-AF65-F5344CB8AC3E}">
+        <p14:creationId xmlns:p14="http://schemas.microsoft.com/office/powerpoint/2010/main" val="4086525410"/>
+      </p:ext>
+    </p:extLst>
+  </p:cSld>
+  <p:clrMapOvr>
+    <a:masterClrMapping/>
+  </p:clrMapOvr>
+</p:notes>
+</file>
+
 <file path=ppt/slideLayouts/slideLayout1.xml><?xml version="1.0" encoding="utf-8"?>
 <p:sldLayout xmlns:a="http://schemas.openxmlformats.org/drawingml/2006/main" xmlns:r="http://schemas.openxmlformats.org/officeDocument/2006/relationships" xmlns:p="http://schemas.openxmlformats.org/presentationml/2006/main" showMasterSp="0" type="title" preserve="1">
   <p:cSld name="Title Slide">
@@ -639,7 +891,7 @@
             <a:fld id="{87DE6118-2437-4B30-8E3C-4D2BE6020583}" type="datetimeFigureOut">
               <a:rPr lang="en-US" smtClean="0"/>
               <a:pPr/>
-              <a:t>3/5/2017</a:t>
+              <a:t>3/9/2017</a:t>
             </a:fld>
             <a:endParaRPr lang="en-US" dirty="0"/>
           </a:p>
@@ -970,7 +1222,7 @@
           <a:p>
             <a:fld id="{87DE6118-2437-4B30-8E3C-4D2BE6020583}" type="datetimeFigureOut">
               <a:rPr lang="en-US" smtClean="0"/>
-              <a:t>3/5/2017</a:t>
+              <a:t>3/9/2017</a:t>
             </a:fld>
             <a:endParaRPr lang="en-US" dirty="0"/>
           </a:p>
@@ -1150,7 +1402,7 @@
           <a:p>
             <a:fld id="{87DE6118-2437-4B30-8E3C-4D2BE6020583}" type="datetimeFigureOut">
               <a:rPr lang="en-US" smtClean="0"/>
-              <a:t>3/5/2017</a:t>
+              <a:t>3/9/2017</a:t>
             </a:fld>
             <a:endParaRPr lang="en-US" dirty="0"/>
           </a:p>
@@ -1320,7 +1572,7 @@
           <a:p>
             <a:fld id="{87DE6118-2437-4B30-8E3C-4D2BE6020583}" type="datetimeFigureOut">
               <a:rPr lang="en-US" smtClean="0"/>
-              <a:t>3/5/2017</a:t>
+              <a:t>3/9/2017</a:t>
             </a:fld>
             <a:endParaRPr lang="en-US" dirty="0"/>
           </a:p>
@@ -1378,6 +1630,13 @@
   <p:clrMapOvr>
     <a:masterClrMapping/>
   </p:clrMapOvr>
+  <p:timing>
+    <p:tnLst>
+      <p:par>
+        <p:cTn id="1" dur="indefinite" restart="never" nodeType="tmRoot"/>
+      </p:par>
+    </p:tnLst>
+  </p:timing>
 </p:sldLayout>
 </file>
 
@@ -1385,9 +1644,15 @@
 <p:sldLayout xmlns:a="http://schemas.openxmlformats.org/drawingml/2006/main" xmlns:r="http://schemas.openxmlformats.org/officeDocument/2006/relationships" xmlns:p="http://schemas.openxmlformats.org/presentationml/2006/main" showMasterSp="0" type="secHead" preserve="1">
   <p:cSld name="Section Header">
     <p:bg>
-      <p:bgRef idx="1001">
-        <a:schemeClr val="bg2"/>
-      </p:bgRef>
+      <p:bgPr>
+        <a:solidFill>
+          <a:schemeClr val="bg1">
+            <a:lumMod val="65000"/>
+            <a:lumOff val="35000"/>
+          </a:schemeClr>
+        </a:solidFill>
+        <a:effectLst/>
+      </p:bgPr>
     </p:bg>
     <p:spTree>
       <p:nvGrpSpPr>
@@ -1598,7 +1863,7 @@
             <a:fld id="{87DE6118-2437-4B30-8E3C-4D2BE6020583}" type="datetimeFigureOut">
               <a:rPr lang="en-US" smtClean="0"/>
               <a:pPr/>
-              <a:t>3/5/2017</a:t>
+              <a:t>3/9/2017</a:t>
             </a:fld>
             <a:endParaRPr lang="en-US" dirty="0"/>
           </a:p>
@@ -1739,6 +2004,13 @@
   <p:clrMapOvr>
     <a:overrideClrMapping bg1="dk1" tx1="lt1" bg2="dk2" tx2="lt2" accent1="accent1" accent2="accent2" accent3="accent3" accent4="accent4" accent5="accent5" accent6="accent6" hlink="hlink" folHlink="folHlink"/>
   </p:clrMapOvr>
+  <p:timing>
+    <p:tnLst>
+      <p:par>
+        <p:cTn id="1" dur="indefinite" restart="never" nodeType="tmRoot"/>
+      </p:par>
+    </p:tnLst>
+  </p:timing>
 </p:sldLayout>
 </file>
 
@@ -1993,7 +2265,7 @@
           <a:p>
             <a:fld id="{87DE6118-2437-4B30-8E3C-4D2BE6020583}" type="datetimeFigureOut">
               <a:rPr lang="en-US" smtClean="0"/>
-              <a:t>3/5/2017</a:t>
+              <a:t>3/9/2017</a:t>
             </a:fld>
             <a:endParaRPr lang="en-US" dirty="0"/>
           </a:p>
@@ -2051,6 +2323,13 @@
   <p:clrMapOvr>
     <a:masterClrMapping/>
   </p:clrMapOvr>
+  <p:timing>
+    <p:tnLst>
+      <p:par>
+        <p:cTn id="1" dur="indefinite" restart="never" nodeType="tmRoot"/>
+      </p:par>
+    </p:tnLst>
+  </p:timing>
 </p:sldLayout>
 </file>
 
@@ -2470,7 +2749,7 @@
           <a:p>
             <a:fld id="{87DE6118-2437-4B30-8E3C-4D2BE6020583}" type="datetimeFigureOut">
               <a:rPr lang="en-US" smtClean="0"/>
-              <a:t>3/5/2017</a:t>
+              <a:t>3/9/2017</a:t>
             </a:fld>
             <a:endParaRPr lang="en-US" dirty="0"/>
           </a:p>
@@ -2528,6 +2807,13 @@
   <p:clrMapOvr>
     <a:masterClrMapping/>
   </p:clrMapOvr>
+  <p:timing>
+    <p:tnLst>
+      <p:par>
+        <p:cTn id="1" dur="indefinite" restart="never" nodeType="tmRoot"/>
+      </p:par>
+    </p:tnLst>
+  </p:timing>
 </p:sldLayout>
 </file>
 
@@ -2588,7 +2874,7 @@
           <a:p>
             <a:fld id="{87DE6118-2437-4B30-8E3C-4D2BE6020583}" type="datetimeFigureOut">
               <a:rPr lang="en-US" smtClean="0"/>
-              <a:t>3/5/2017</a:t>
+              <a:t>3/9/2017</a:t>
             </a:fld>
             <a:endParaRPr lang="en-US" dirty="0"/>
           </a:p>
@@ -2646,6 +2932,13 @@
   <p:clrMapOvr>
     <a:masterClrMapping/>
   </p:clrMapOvr>
+  <p:timing>
+    <p:tnLst>
+      <p:par>
+        <p:cTn id="1" dur="indefinite" restart="never" nodeType="tmRoot"/>
+      </p:par>
+    </p:tnLst>
+  </p:timing>
 </p:sldLayout>
 </file>
 
@@ -2683,7 +2976,7 @@
           <a:p>
             <a:fld id="{87DE6118-2437-4B30-8E3C-4D2BE6020583}" type="datetimeFigureOut">
               <a:rPr lang="en-US" smtClean="0"/>
-              <a:t>3/5/2017</a:t>
+              <a:t>3/9/2017</a:t>
             </a:fld>
             <a:endParaRPr lang="en-US" dirty="0"/>
           </a:p>
@@ -3030,7 +3323,7 @@
             <a:fld id="{87DE6118-2437-4B30-8E3C-4D2BE6020583}" type="datetimeFigureOut">
               <a:rPr lang="en-US" smtClean="0"/>
               <a:pPr/>
-              <a:t>3/5/2017</a:t>
+              <a:t>3/9/2017</a:t>
             </a:fld>
             <a:endParaRPr lang="en-US" dirty="0"/>
           </a:p>
@@ -3420,7 +3713,7 @@
             <a:fld id="{87DE6118-2437-4B30-8E3C-4D2BE6020583}" type="datetimeFigureOut">
               <a:rPr lang="en-US" smtClean="0"/>
               <a:pPr/>
-              <a:t>3/5/2017</a:t>
+              <a:t>3/9/2017</a:t>
             </a:fld>
             <a:endParaRPr lang="en-US" dirty="0"/>
           </a:p>
@@ -3700,7 +3993,7 @@
             <a:fld id="{87DE6118-2437-4B30-8E3C-4D2BE6020583}" type="datetimeFigureOut">
               <a:rPr lang="en-US" smtClean="0"/>
               <a:pPr/>
-              <a:t>3/5/2017</a:t>
+              <a:t>3/9/2017</a:t>
             </a:fld>
             <a:endParaRPr lang="en-US" dirty="0"/>
           </a:p>
@@ -4229,34 +4522,64 @@
           <a:lstStyle/>
           <a:p>
             <a:r>
-              <a:rPr lang="en-US" dirty="0" err="1">
+              <a:rPr lang="en-US" dirty="0" err="1" smtClean="0">
                 <a:solidFill>
                   <a:schemeClr val="bg1">
                     <a:lumMod val="50000"/>
                   </a:schemeClr>
                 </a:solidFill>
               </a:rPr>
-              <a:t>Monogdb</a:t>
-            </a:r>
-            <a:r>
-              <a:rPr lang="en-US" dirty="0">
+              <a:t>Mongodb</a:t>
+            </a:r>
+            <a:r>
+              <a:rPr lang="en-US" dirty="0" smtClean="0">
                 <a:solidFill>
                   <a:schemeClr val="bg1">
                     <a:lumMod val="50000"/>
                   </a:schemeClr>
                 </a:solidFill>
               </a:rPr>
-              <a:t> or </a:t>
-            </a:r>
-            <a:r>
-              <a:rPr lang="en-US" dirty="0" err="1">
+              <a:t> </a:t>
+            </a:r>
+            <a:r>
+              <a:rPr lang="en-US" dirty="0">
                 <a:solidFill>
                   <a:schemeClr val="bg1">
                     <a:lumMod val="50000"/>
                   </a:schemeClr>
                 </a:solidFill>
               </a:rPr>
+              <a:t>or </a:t>
+            </a:r>
+            <a:r>
+              <a:rPr lang="en-US" dirty="0" err="1" smtClean="0">
+                <a:solidFill>
+                  <a:schemeClr val="bg1">
+                    <a:lumMod val="50000"/>
+                  </a:schemeClr>
+                </a:solidFill>
+              </a:rPr>
               <a:t>Mongoosejs</a:t>
+            </a:r>
+            <a:r>
+              <a:rPr lang="en-US" dirty="0" smtClean="0">
+                <a:solidFill>
+                  <a:schemeClr val="bg1">
+                    <a:lumMod val="50000"/>
+                  </a:schemeClr>
+                </a:solidFill>
+              </a:rPr>
+              <a:t> OR </a:t>
+            </a:r>
+            <a:r>
+              <a:rPr lang="en-US" dirty="0" err="1" smtClean="0">
+                <a:solidFill>
+                  <a:schemeClr val="bg1">
+                    <a:lumMod val="50000"/>
+                  </a:schemeClr>
+                </a:solidFill>
+              </a:rPr>
+              <a:t>Mongojs</a:t>
             </a:r>
             <a:endParaRPr lang="bg-BG" dirty="0">
               <a:solidFill>
@@ -4352,10 +4675,2349 @@
   <p:clrMapOvr>
     <a:masterClrMapping/>
   </p:clrMapOvr>
+  <p:timing>
+    <p:tnLst>
+      <p:par>
+        <p:cTn id="1" dur="indefinite" restart="never" nodeType="tmRoot"/>
+      </p:par>
+    </p:tnLst>
+  </p:timing>
+</p:sld>
+</file>
+
+<file path=ppt/slides/slide10.xml><?xml version="1.0" encoding="utf-8"?>
+<p:sld xmlns:a="http://schemas.openxmlformats.org/drawingml/2006/main" xmlns:r="http://schemas.openxmlformats.org/officeDocument/2006/relationships" xmlns:p="http://schemas.openxmlformats.org/presentationml/2006/main">
+  <p:cSld>
+    <p:spTree>
+      <p:nvGrpSpPr>
+        <p:cNvPr id="1" name=""/>
+        <p:cNvGrpSpPr/>
+        <p:nvPr/>
+      </p:nvGrpSpPr>
+      <p:grpSpPr>
+        <a:xfrm>
+          <a:off x="0" y="0"/>
+          <a:ext cx="0" cy="0"/>
+          <a:chOff x="0" y="0"/>
+          <a:chExt cx="0" cy="0"/>
+        </a:xfrm>
+      </p:grpSpPr>
+      <p:sp>
+        <p:nvSpPr>
+          <p:cNvPr id="2" name="Title 1"/>
+          <p:cNvSpPr>
+            <a:spLocks noGrp="1"/>
+          </p:cNvSpPr>
+          <p:nvPr>
+            <p:ph type="title"/>
+          </p:nvPr>
+        </p:nvSpPr>
+        <p:spPr/>
+        <p:txBody>
+          <a:bodyPr/>
+          <a:lstStyle/>
+          <a:p>
+            <a:r>
+              <a:rPr lang="en-US" b="1" u="sng" dirty="0">
+                <a:solidFill>
+                  <a:schemeClr val="tx1"/>
+                </a:solidFill>
+              </a:rPr>
+              <a:t>Document </a:t>
+            </a:r>
+            <a:r>
+              <a:rPr lang="en-US" b="1" u="sng" dirty="0" smtClean="0">
+                <a:solidFill>
+                  <a:schemeClr val="tx1"/>
+                </a:solidFill>
+              </a:rPr>
+              <a:t>oriented</a:t>
+            </a:r>
+            <a:endParaRPr lang="bg-BG" b="1" u="sng" dirty="0">
+              <a:solidFill>
+                <a:schemeClr val="tx1"/>
+              </a:solidFill>
+            </a:endParaRPr>
+          </a:p>
+        </p:txBody>
+      </p:sp>
+      <p:sp>
+        <p:nvSpPr>
+          <p:cNvPr id="9" name="Rounded Rectangle 8"/>
+          <p:cNvSpPr/>
+          <p:nvPr/>
+        </p:nvSpPr>
+        <p:spPr>
+          <a:xfrm>
+            <a:off x="2561205" y="3150555"/>
+            <a:ext cx="2001915" cy="396166"/>
+          </a:xfrm>
+          <a:prstGeom prst="roundRect">
+            <a:avLst/>
+          </a:prstGeom>
+          <a:solidFill>
+            <a:srgbClr val="0070C0"/>
+          </a:solidFill>
+          <a:ln w="19050">
+            <a:solidFill>
+              <a:schemeClr val="bg1"/>
+            </a:solidFill>
+          </a:ln>
+        </p:spPr>
+        <p:style>
+          <a:lnRef idx="2">
+            <a:schemeClr val="accent1">
+              <a:shade val="50000"/>
+            </a:schemeClr>
+          </a:lnRef>
+          <a:fillRef idx="1">
+            <a:schemeClr val="accent1"/>
+          </a:fillRef>
+          <a:effectRef idx="0">
+            <a:schemeClr val="accent1"/>
+          </a:effectRef>
+          <a:fontRef idx="minor">
+            <a:schemeClr val="lt1"/>
+          </a:fontRef>
+        </p:style>
+        <p:txBody>
+          <a:bodyPr rtlCol="0" anchor="ctr"/>
+          <a:lstStyle/>
+          <a:p>
+            <a:pPr algn="ctr"/>
+            <a:r>
+              <a:rPr lang="en-US" dirty="0" smtClean="0"/>
+              <a:t>database</a:t>
+            </a:r>
+            <a:endParaRPr lang="bg-BG" dirty="0"/>
+          </a:p>
+        </p:txBody>
+      </p:sp>
+      <p:sp>
+        <p:nvSpPr>
+          <p:cNvPr id="10" name="Rounded Rectangle 9"/>
+          <p:cNvSpPr/>
+          <p:nvPr/>
+        </p:nvSpPr>
+        <p:spPr>
+          <a:xfrm>
+            <a:off x="2561208" y="3813236"/>
+            <a:ext cx="2001915" cy="396166"/>
+          </a:xfrm>
+          <a:prstGeom prst="roundRect">
+            <a:avLst/>
+          </a:prstGeom>
+          <a:solidFill>
+            <a:srgbClr val="0070C0"/>
+          </a:solidFill>
+          <a:ln w="19050">
+            <a:solidFill>
+              <a:schemeClr val="bg1"/>
+            </a:solidFill>
+          </a:ln>
+        </p:spPr>
+        <p:style>
+          <a:lnRef idx="2">
+            <a:schemeClr val="accent1">
+              <a:shade val="50000"/>
+            </a:schemeClr>
+          </a:lnRef>
+          <a:fillRef idx="1">
+            <a:schemeClr val="accent1"/>
+          </a:fillRef>
+          <a:effectRef idx="0">
+            <a:schemeClr val="accent1"/>
+          </a:effectRef>
+          <a:fontRef idx="minor">
+            <a:schemeClr val="lt1"/>
+          </a:fontRef>
+        </p:style>
+        <p:txBody>
+          <a:bodyPr rtlCol="0" anchor="ctr"/>
+          <a:lstStyle/>
+          <a:p>
+            <a:pPr algn="ctr"/>
+            <a:r>
+              <a:rPr lang="en-US" dirty="0" smtClean="0"/>
+              <a:t>tables</a:t>
+            </a:r>
+            <a:endParaRPr lang="bg-BG" dirty="0"/>
+          </a:p>
+        </p:txBody>
+      </p:sp>
+      <p:sp>
+        <p:nvSpPr>
+          <p:cNvPr id="11" name="Rounded Rectangle 10"/>
+          <p:cNvSpPr/>
+          <p:nvPr/>
+        </p:nvSpPr>
+        <p:spPr>
+          <a:xfrm>
+            <a:off x="2561206" y="4472588"/>
+            <a:ext cx="2001915" cy="396166"/>
+          </a:xfrm>
+          <a:prstGeom prst="roundRect">
+            <a:avLst/>
+          </a:prstGeom>
+          <a:solidFill>
+            <a:srgbClr val="0070C0"/>
+          </a:solidFill>
+          <a:ln w="19050">
+            <a:solidFill>
+              <a:schemeClr val="bg1"/>
+            </a:solidFill>
+          </a:ln>
+        </p:spPr>
+        <p:style>
+          <a:lnRef idx="2">
+            <a:schemeClr val="accent1">
+              <a:shade val="50000"/>
+            </a:schemeClr>
+          </a:lnRef>
+          <a:fillRef idx="1">
+            <a:schemeClr val="accent1"/>
+          </a:fillRef>
+          <a:effectRef idx="0">
+            <a:schemeClr val="accent1"/>
+          </a:effectRef>
+          <a:fontRef idx="minor">
+            <a:schemeClr val="lt1"/>
+          </a:fontRef>
+        </p:style>
+        <p:txBody>
+          <a:bodyPr rtlCol="0" anchor="ctr"/>
+          <a:lstStyle/>
+          <a:p>
+            <a:pPr algn="ctr"/>
+            <a:r>
+              <a:rPr lang="en-US"/>
+              <a:t>rows</a:t>
+            </a:r>
+            <a:endParaRPr lang="bg-BG" dirty="0"/>
+          </a:p>
+        </p:txBody>
+      </p:sp>
+      <p:sp>
+        <p:nvSpPr>
+          <p:cNvPr id="12" name="Rounded Rectangle 11"/>
+          <p:cNvSpPr/>
+          <p:nvPr/>
+        </p:nvSpPr>
+        <p:spPr>
+          <a:xfrm>
+            <a:off x="2561207" y="5131940"/>
+            <a:ext cx="2001915" cy="396166"/>
+          </a:xfrm>
+          <a:prstGeom prst="roundRect">
+            <a:avLst/>
+          </a:prstGeom>
+          <a:solidFill>
+            <a:srgbClr val="0070C0"/>
+          </a:solidFill>
+          <a:ln w="19050">
+            <a:solidFill>
+              <a:schemeClr val="bg1"/>
+            </a:solidFill>
+          </a:ln>
+        </p:spPr>
+        <p:style>
+          <a:lnRef idx="2">
+            <a:schemeClr val="accent1">
+              <a:shade val="50000"/>
+            </a:schemeClr>
+          </a:lnRef>
+          <a:fillRef idx="1">
+            <a:schemeClr val="accent1"/>
+          </a:fillRef>
+          <a:effectRef idx="0">
+            <a:schemeClr val="accent1"/>
+          </a:effectRef>
+          <a:fontRef idx="minor">
+            <a:schemeClr val="lt1"/>
+          </a:fontRef>
+        </p:style>
+        <p:txBody>
+          <a:bodyPr rtlCol="0" anchor="ctr"/>
+          <a:lstStyle/>
+          <a:p>
+            <a:pPr algn="ctr"/>
+            <a:r>
+              <a:rPr lang="en-US" dirty="0"/>
+              <a:t>columns</a:t>
+            </a:r>
+            <a:endParaRPr lang="bg-BG" dirty="0"/>
+          </a:p>
+        </p:txBody>
+      </p:sp>
+      <p:sp>
+        <p:nvSpPr>
+          <p:cNvPr id="13" name="Rounded Rectangle 12"/>
+          <p:cNvSpPr/>
+          <p:nvPr/>
+        </p:nvSpPr>
+        <p:spPr>
+          <a:xfrm>
+            <a:off x="2561205" y="5791292"/>
+            <a:ext cx="2001915" cy="396166"/>
+          </a:xfrm>
+          <a:prstGeom prst="roundRect">
+            <a:avLst/>
+          </a:prstGeom>
+          <a:solidFill>
+            <a:srgbClr val="0070C0"/>
+          </a:solidFill>
+          <a:ln w="19050">
+            <a:solidFill>
+              <a:schemeClr val="bg1"/>
+            </a:solidFill>
+          </a:ln>
+        </p:spPr>
+        <p:style>
+          <a:lnRef idx="2">
+            <a:schemeClr val="accent1">
+              <a:shade val="50000"/>
+            </a:schemeClr>
+          </a:lnRef>
+          <a:fillRef idx="1">
+            <a:schemeClr val="accent1"/>
+          </a:fillRef>
+          <a:effectRef idx="0">
+            <a:schemeClr val="accent1"/>
+          </a:effectRef>
+          <a:fontRef idx="minor">
+            <a:schemeClr val="lt1"/>
+          </a:fontRef>
+        </p:style>
+        <p:txBody>
+          <a:bodyPr rtlCol="0" anchor="ctr"/>
+          <a:lstStyle/>
+          <a:p>
+            <a:pPr algn="ctr"/>
+            <a:r>
+              <a:rPr lang="en-US" dirty="0" smtClean="0"/>
+              <a:t>join</a:t>
+            </a:r>
+            <a:endParaRPr lang="bg-BG" dirty="0"/>
+          </a:p>
+        </p:txBody>
+      </p:sp>
+      <p:sp>
+        <p:nvSpPr>
+          <p:cNvPr id="15" name="Rounded Rectangle 14"/>
+          <p:cNvSpPr/>
+          <p:nvPr/>
+        </p:nvSpPr>
+        <p:spPr>
+          <a:xfrm>
+            <a:off x="7642190" y="2487874"/>
+            <a:ext cx="2868967" cy="396166"/>
+          </a:xfrm>
+          <a:prstGeom prst="roundRect">
+            <a:avLst/>
+          </a:prstGeom>
+          <a:solidFill>
+            <a:srgbClr val="00B050"/>
+          </a:solidFill>
+          <a:ln w="19050">
+            <a:solidFill>
+              <a:schemeClr val="bg1"/>
+            </a:solidFill>
+          </a:ln>
+        </p:spPr>
+        <p:style>
+          <a:lnRef idx="2">
+            <a:schemeClr val="accent1">
+              <a:shade val="50000"/>
+            </a:schemeClr>
+          </a:lnRef>
+          <a:fillRef idx="1">
+            <a:schemeClr val="accent1"/>
+          </a:fillRef>
+          <a:effectRef idx="0">
+            <a:schemeClr val="accent1"/>
+          </a:effectRef>
+          <a:fontRef idx="minor">
+            <a:schemeClr val="lt1"/>
+          </a:fontRef>
+        </p:style>
+        <p:txBody>
+          <a:bodyPr rtlCol="0" anchor="ctr"/>
+          <a:lstStyle/>
+          <a:p>
+            <a:pPr algn="ctr"/>
+            <a:r>
+              <a:rPr lang="en-US" dirty="0" smtClean="0"/>
+              <a:t>MongoDB Terms/Concepts</a:t>
+            </a:r>
+            <a:endParaRPr lang="bg-BG" dirty="0"/>
+          </a:p>
+        </p:txBody>
+      </p:sp>
+      <p:sp>
+        <p:nvSpPr>
+          <p:cNvPr id="16" name="Rounded Rectangle 15"/>
+          <p:cNvSpPr/>
+          <p:nvPr/>
+        </p:nvSpPr>
+        <p:spPr>
+          <a:xfrm>
+            <a:off x="8075718" y="3143897"/>
+            <a:ext cx="2001915" cy="396166"/>
+          </a:xfrm>
+          <a:prstGeom prst="roundRect">
+            <a:avLst/>
+          </a:prstGeom>
+          <a:solidFill>
+            <a:srgbClr val="00B050"/>
+          </a:solidFill>
+          <a:ln w="19050">
+            <a:solidFill>
+              <a:schemeClr val="bg1"/>
+            </a:solidFill>
+          </a:ln>
+        </p:spPr>
+        <p:style>
+          <a:lnRef idx="2">
+            <a:schemeClr val="accent1">
+              <a:shade val="50000"/>
+            </a:schemeClr>
+          </a:lnRef>
+          <a:fillRef idx="1">
+            <a:schemeClr val="accent1"/>
+          </a:fillRef>
+          <a:effectRef idx="0">
+            <a:schemeClr val="accent1"/>
+          </a:effectRef>
+          <a:fontRef idx="minor">
+            <a:schemeClr val="lt1"/>
+          </a:fontRef>
+        </p:style>
+        <p:txBody>
+          <a:bodyPr rtlCol="0" anchor="ctr"/>
+          <a:lstStyle/>
+          <a:p>
+            <a:pPr algn="ctr"/>
+            <a:r>
+              <a:rPr lang="en-US" dirty="0" smtClean="0"/>
+              <a:t>database</a:t>
+            </a:r>
+            <a:endParaRPr lang="bg-BG" dirty="0"/>
+          </a:p>
+        </p:txBody>
+      </p:sp>
+      <p:sp>
+        <p:nvSpPr>
+          <p:cNvPr id="17" name="Rounded Rectangle 16"/>
+          <p:cNvSpPr/>
+          <p:nvPr/>
+        </p:nvSpPr>
+        <p:spPr>
+          <a:xfrm>
+            <a:off x="8075721" y="3806578"/>
+            <a:ext cx="2001915" cy="396166"/>
+          </a:xfrm>
+          <a:prstGeom prst="roundRect">
+            <a:avLst/>
+          </a:prstGeom>
+          <a:solidFill>
+            <a:srgbClr val="00B050"/>
+          </a:solidFill>
+          <a:ln w="19050">
+            <a:solidFill>
+              <a:schemeClr val="bg1"/>
+            </a:solidFill>
+          </a:ln>
+        </p:spPr>
+        <p:style>
+          <a:lnRef idx="2">
+            <a:schemeClr val="accent1">
+              <a:shade val="50000"/>
+            </a:schemeClr>
+          </a:lnRef>
+          <a:fillRef idx="1">
+            <a:schemeClr val="accent1"/>
+          </a:fillRef>
+          <a:effectRef idx="0">
+            <a:schemeClr val="accent1"/>
+          </a:effectRef>
+          <a:fontRef idx="minor">
+            <a:schemeClr val="lt1"/>
+          </a:fontRef>
+        </p:style>
+        <p:txBody>
+          <a:bodyPr rtlCol="0" anchor="ctr"/>
+          <a:lstStyle/>
+          <a:p>
+            <a:pPr algn="ctr"/>
+            <a:r>
+              <a:rPr lang="en-US" dirty="0" smtClean="0"/>
+              <a:t>collections</a:t>
+            </a:r>
+            <a:endParaRPr lang="bg-BG" dirty="0"/>
+          </a:p>
+        </p:txBody>
+      </p:sp>
+      <p:sp>
+        <p:nvSpPr>
+          <p:cNvPr id="18" name="Rounded Rectangle 17"/>
+          <p:cNvSpPr/>
+          <p:nvPr/>
+        </p:nvSpPr>
+        <p:spPr>
+          <a:xfrm>
+            <a:off x="8075719" y="4465930"/>
+            <a:ext cx="2001915" cy="396166"/>
+          </a:xfrm>
+          <a:prstGeom prst="roundRect">
+            <a:avLst/>
+          </a:prstGeom>
+          <a:solidFill>
+            <a:srgbClr val="00B050"/>
+          </a:solidFill>
+          <a:ln w="19050">
+            <a:solidFill>
+              <a:schemeClr val="bg1"/>
+            </a:solidFill>
+          </a:ln>
+        </p:spPr>
+        <p:style>
+          <a:lnRef idx="2">
+            <a:schemeClr val="accent1">
+              <a:shade val="50000"/>
+            </a:schemeClr>
+          </a:lnRef>
+          <a:fillRef idx="1">
+            <a:schemeClr val="accent1"/>
+          </a:fillRef>
+          <a:effectRef idx="0">
+            <a:schemeClr val="accent1"/>
+          </a:effectRef>
+          <a:fontRef idx="minor">
+            <a:schemeClr val="lt1"/>
+          </a:fontRef>
+        </p:style>
+        <p:txBody>
+          <a:bodyPr rtlCol="0" anchor="ctr"/>
+          <a:lstStyle/>
+          <a:p>
+            <a:pPr algn="ctr"/>
+            <a:r>
+              <a:rPr lang="en-US" dirty="0"/>
+              <a:t>d</a:t>
+            </a:r>
+            <a:r>
+              <a:rPr lang="en-US" dirty="0" smtClean="0"/>
+              <a:t>ocuments BSON</a:t>
+            </a:r>
+            <a:endParaRPr lang="bg-BG" dirty="0"/>
+          </a:p>
+        </p:txBody>
+      </p:sp>
+      <p:sp>
+        <p:nvSpPr>
+          <p:cNvPr id="19" name="Rounded Rectangle 18"/>
+          <p:cNvSpPr/>
+          <p:nvPr/>
+        </p:nvSpPr>
+        <p:spPr>
+          <a:xfrm>
+            <a:off x="8075720" y="5125282"/>
+            <a:ext cx="2001915" cy="396166"/>
+          </a:xfrm>
+          <a:prstGeom prst="roundRect">
+            <a:avLst/>
+          </a:prstGeom>
+          <a:solidFill>
+            <a:srgbClr val="00B050"/>
+          </a:solidFill>
+          <a:ln w="19050">
+            <a:solidFill>
+              <a:schemeClr val="bg1"/>
+            </a:solidFill>
+          </a:ln>
+        </p:spPr>
+        <p:style>
+          <a:lnRef idx="2">
+            <a:schemeClr val="accent1">
+              <a:shade val="50000"/>
+            </a:schemeClr>
+          </a:lnRef>
+          <a:fillRef idx="1">
+            <a:schemeClr val="accent1"/>
+          </a:fillRef>
+          <a:effectRef idx="0">
+            <a:schemeClr val="accent1"/>
+          </a:effectRef>
+          <a:fontRef idx="minor">
+            <a:schemeClr val="lt1"/>
+          </a:fontRef>
+        </p:style>
+        <p:txBody>
+          <a:bodyPr rtlCol="0" anchor="ctr"/>
+          <a:lstStyle/>
+          <a:p>
+            <a:pPr algn="ctr"/>
+            <a:r>
+              <a:rPr lang="en-US" dirty="0" smtClean="0"/>
+              <a:t>fields</a:t>
+            </a:r>
+            <a:endParaRPr lang="bg-BG" dirty="0"/>
+          </a:p>
+        </p:txBody>
+      </p:sp>
+      <p:sp>
+        <p:nvSpPr>
+          <p:cNvPr id="20" name="Rounded Rectangle 19"/>
+          <p:cNvSpPr/>
+          <p:nvPr/>
+        </p:nvSpPr>
+        <p:spPr>
+          <a:xfrm>
+            <a:off x="8075717" y="5782136"/>
+            <a:ext cx="2001915" cy="396166"/>
+          </a:xfrm>
+          <a:prstGeom prst="roundRect">
+            <a:avLst/>
+          </a:prstGeom>
+          <a:solidFill>
+            <a:srgbClr val="00B050"/>
+          </a:solidFill>
+          <a:ln w="19050">
+            <a:solidFill>
+              <a:schemeClr val="bg1"/>
+            </a:solidFill>
+          </a:ln>
+        </p:spPr>
+        <p:style>
+          <a:lnRef idx="2">
+            <a:schemeClr val="accent1">
+              <a:shade val="50000"/>
+            </a:schemeClr>
+          </a:lnRef>
+          <a:fillRef idx="1">
+            <a:schemeClr val="accent1"/>
+          </a:fillRef>
+          <a:effectRef idx="0">
+            <a:schemeClr val="accent1"/>
+          </a:effectRef>
+          <a:fontRef idx="minor">
+            <a:schemeClr val="lt1"/>
+          </a:fontRef>
+        </p:style>
+        <p:txBody>
+          <a:bodyPr rtlCol="0" anchor="ctr"/>
+          <a:lstStyle/>
+          <a:p>
+            <a:pPr algn="ctr"/>
+            <a:r>
+              <a:rPr lang="en-US" dirty="0" smtClean="0"/>
+              <a:t>embedding/link</a:t>
+            </a:r>
+            <a:endParaRPr lang="bg-BG" dirty="0"/>
+          </a:p>
+        </p:txBody>
+      </p:sp>
+      <p:sp>
+        <p:nvSpPr>
+          <p:cNvPr id="21" name="Rounded Rectangle 20"/>
+          <p:cNvSpPr/>
+          <p:nvPr/>
+        </p:nvSpPr>
+        <p:spPr>
+          <a:xfrm>
+            <a:off x="2126200" y="2487874"/>
+            <a:ext cx="2868967" cy="396166"/>
+          </a:xfrm>
+          <a:prstGeom prst="roundRect">
+            <a:avLst/>
+          </a:prstGeom>
+          <a:solidFill>
+            <a:srgbClr val="0070C0"/>
+          </a:solidFill>
+          <a:ln w="19050">
+            <a:solidFill>
+              <a:schemeClr val="bg1"/>
+            </a:solidFill>
+          </a:ln>
+        </p:spPr>
+        <p:style>
+          <a:lnRef idx="2">
+            <a:schemeClr val="accent1">
+              <a:shade val="50000"/>
+            </a:schemeClr>
+          </a:lnRef>
+          <a:fillRef idx="1">
+            <a:schemeClr val="accent1"/>
+          </a:fillRef>
+          <a:effectRef idx="0">
+            <a:schemeClr val="accent1"/>
+          </a:effectRef>
+          <a:fontRef idx="minor">
+            <a:schemeClr val="lt1"/>
+          </a:fontRef>
+        </p:style>
+        <p:txBody>
+          <a:bodyPr rtlCol="0" anchor="ctr"/>
+          <a:lstStyle/>
+          <a:p>
+            <a:pPr algn="ctr"/>
+            <a:r>
+              <a:rPr lang="en-US" dirty="0"/>
+              <a:t>SQL Terms/Concepts</a:t>
+            </a:r>
+            <a:endParaRPr lang="bg-BG" dirty="0"/>
+          </a:p>
+        </p:txBody>
+      </p:sp>
+      <p:cxnSp>
+        <p:nvCxnSpPr>
+          <p:cNvPr id="23" name="Straight Arrow Connector 22"/>
+          <p:cNvCxnSpPr/>
+          <p:nvPr/>
+        </p:nvCxnSpPr>
+        <p:spPr>
+          <a:xfrm>
+            <a:off x="4995167" y="3336431"/>
+            <a:ext cx="2647023" cy="17756"/>
+          </a:xfrm>
+          <a:prstGeom prst="straightConnector1">
+            <a:avLst/>
+          </a:prstGeom>
+          <a:ln>
+            <a:solidFill>
+              <a:schemeClr val="tx1"/>
+            </a:solidFill>
+            <a:prstDash val="dash"/>
+            <a:tailEnd type="triangle"/>
+          </a:ln>
+        </p:spPr>
+        <p:style>
+          <a:lnRef idx="1">
+            <a:schemeClr val="accent1"/>
+          </a:lnRef>
+          <a:fillRef idx="0">
+            <a:schemeClr val="accent1"/>
+          </a:fillRef>
+          <a:effectRef idx="0">
+            <a:schemeClr val="accent1"/>
+          </a:effectRef>
+          <a:fontRef idx="minor">
+            <a:schemeClr val="tx1"/>
+          </a:fontRef>
+        </p:style>
+      </p:cxnSp>
+      <p:cxnSp>
+        <p:nvCxnSpPr>
+          <p:cNvPr id="25" name="Straight Arrow Connector 24"/>
+          <p:cNvCxnSpPr/>
+          <p:nvPr/>
+        </p:nvCxnSpPr>
+        <p:spPr>
+          <a:xfrm>
+            <a:off x="4995167" y="3994210"/>
+            <a:ext cx="2647023" cy="17756"/>
+          </a:xfrm>
+          <a:prstGeom prst="straightConnector1">
+            <a:avLst/>
+          </a:prstGeom>
+          <a:ln>
+            <a:solidFill>
+              <a:schemeClr val="tx1"/>
+            </a:solidFill>
+            <a:prstDash val="dash"/>
+            <a:tailEnd type="triangle"/>
+          </a:ln>
+        </p:spPr>
+        <p:style>
+          <a:lnRef idx="1">
+            <a:schemeClr val="accent1"/>
+          </a:lnRef>
+          <a:fillRef idx="0">
+            <a:schemeClr val="accent1"/>
+          </a:fillRef>
+          <a:effectRef idx="0">
+            <a:schemeClr val="accent1"/>
+          </a:effectRef>
+          <a:fontRef idx="minor">
+            <a:schemeClr val="tx1"/>
+          </a:fontRef>
+        </p:style>
+      </p:cxnSp>
+      <p:cxnSp>
+        <p:nvCxnSpPr>
+          <p:cNvPr id="26" name="Straight Arrow Connector 25"/>
+          <p:cNvCxnSpPr/>
+          <p:nvPr/>
+        </p:nvCxnSpPr>
+        <p:spPr>
+          <a:xfrm>
+            <a:off x="4995166" y="4651989"/>
+            <a:ext cx="2647023" cy="17756"/>
+          </a:xfrm>
+          <a:prstGeom prst="straightConnector1">
+            <a:avLst/>
+          </a:prstGeom>
+          <a:ln>
+            <a:solidFill>
+              <a:schemeClr val="tx1"/>
+            </a:solidFill>
+            <a:prstDash val="dash"/>
+            <a:tailEnd type="triangle"/>
+          </a:ln>
+        </p:spPr>
+        <p:style>
+          <a:lnRef idx="1">
+            <a:schemeClr val="accent1"/>
+          </a:lnRef>
+          <a:fillRef idx="0">
+            <a:schemeClr val="accent1"/>
+          </a:fillRef>
+          <a:effectRef idx="0">
+            <a:schemeClr val="accent1"/>
+          </a:effectRef>
+          <a:fontRef idx="minor">
+            <a:schemeClr val="tx1"/>
+          </a:fontRef>
+        </p:style>
+      </p:cxnSp>
+      <p:cxnSp>
+        <p:nvCxnSpPr>
+          <p:cNvPr id="27" name="Straight Arrow Connector 26"/>
+          <p:cNvCxnSpPr/>
+          <p:nvPr/>
+        </p:nvCxnSpPr>
+        <p:spPr>
+          <a:xfrm>
+            <a:off x="4995165" y="5309768"/>
+            <a:ext cx="2647023" cy="17756"/>
+          </a:xfrm>
+          <a:prstGeom prst="straightConnector1">
+            <a:avLst/>
+          </a:prstGeom>
+          <a:ln>
+            <a:solidFill>
+              <a:schemeClr val="tx1"/>
+            </a:solidFill>
+            <a:prstDash val="dash"/>
+            <a:tailEnd type="triangle"/>
+          </a:ln>
+        </p:spPr>
+        <p:style>
+          <a:lnRef idx="1">
+            <a:schemeClr val="accent1"/>
+          </a:lnRef>
+          <a:fillRef idx="0">
+            <a:schemeClr val="accent1"/>
+          </a:fillRef>
+          <a:effectRef idx="0">
+            <a:schemeClr val="accent1"/>
+          </a:effectRef>
+          <a:fontRef idx="minor">
+            <a:schemeClr val="tx1"/>
+          </a:fontRef>
+        </p:style>
+      </p:cxnSp>
+      <p:cxnSp>
+        <p:nvCxnSpPr>
+          <p:cNvPr id="28" name="Straight Arrow Connector 27"/>
+          <p:cNvCxnSpPr/>
+          <p:nvPr/>
+        </p:nvCxnSpPr>
+        <p:spPr>
+          <a:xfrm>
+            <a:off x="4988507" y="5967547"/>
+            <a:ext cx="2647023" cy="17756"/>
+          </a:xfrm>
+          <a:prstGeom prst="straightConnector1">
+            <a:avLst/>
+          </a:prstGeom>
+          <a:ln>
+            <a:solidFill>
+              <a:schemeClr val="tx1"/>
+            </a:solidFill>
+            <a:prstDash val="dash"/>
+            <a:tailEnd type="triangle"/>
+          </a:ln>
+        </p:spPr>
+        <p:style>
+          <a:lnRef idx="1">
+            <a:schemeClr val="accent1"/>
+          </a:lnRef>
+          <a:fillRef idx="0">
+            <a:schemeClr val="accent1"/>
+          </a:fillRef>
+          <a:effectRef idx="0">
+            <a:schemeClr val="accent1"/>
+          </a:effectRef>
+          <a:fontRef idx="minor">
+            <a:schemeClr val="tx1"/>
+          </a:fontRef>
+        </p:style>
+      </p:cxnSp>
+    </p:spTree>
+    <p:extLst>
+      <p:ext uri="{BB962C8B-B14F-4D97-AF65-F5344CB8AC3E}">
+        <p14:creationId xmlns:p14="http://schemas.microsoft.com/office/powerpoint/2010/main" val="526480515"/>
+      </p:ext>
+    </p:extLst>
+  </p:cSld>
+  <p:clrMapOvr>
+    <a:masterClrMapping/>
+  </p:clrMapOvr>
+  <p:timing>
+    <p:tnLst>
+      <p:par>
+        <p:cTn id="1" dur="indefinite" restart="never" nodeType="tmRoot"/>
+      </p:par>
+    </p:tnLst>
+  </p:timing>
+</p:sld>
+</file>
+
+<file path=ppt/slides/slide11.xml><?xml version="1.0" encoding="utf-8"?>
+<p:sld xmlns:a="http://schemas.openxmlformats.org/drawingml/2006/main" xmlns:r="http://schemas.openxmlformats.org/officeDocument/2006/relationships" xmlns:p="http://schemas.openxmlformats.org/presentationml/2006/main">
+  <p:cSld>
+    <p:spTree>
+      <p:nvGrpSpPr>
+        <p:cNvPr id="1" name=""/>
+        <p:cNvGrpSpPr/>
+        <p:nvPr/>
+      </p:nvGrpSpPr>
+      <p:grpSpPr>
+        <a:xfrm>
+          <a:off x="0" y="0"/>
+          <a:ext cx="0" cy="0"/>
+          <a:chOff x="0" y="0"/>
+          <a:chExt cx="0" cy="0"/>
+        </a:xfrm>
+      </p:grpSpPr>
+      <p:sp>
+        <p:nvSpPr>
+          <p:cNvPr id="2" name="Title 1"/>
+          <p:cNvSpPr>
+            <a:spLocks noGrp="1"/>
+          </p:cNvSpPr>
+          <p:nvPr>
+            <p:ph type="title"/>
+          </p:nvPr>
+        </p:nvSpPr>
+        <p:spPr/>
+        <p:txBody>
+          <a:bodyPr/>
+          <a:lstStyle/>
+          <a:p>
+            <a:r>
+              <a:rPr lang="en-US" b="1" u="sng" dirty="0"/>
+              <a:t>Non-relational &amp; </a:t>
+            </a:r>
+            <a:r>
+              <a:rPr lang="en-US" b="1" u="sng" dirty="0" smtClean="0"/>
+              <a:t>Schema-less</a:t>
+            </a:r>
+            <a:endParaRPr lang="bg-BG" b="1" u="sng" dirty="0"/>
+          </a:p>
+        </p:txBody>
+      </p:sp>
+      <p:sp>
+        <p:nvSpPr>
+          <p:cNvPr id="12" name="Text Placeholder 11"/>
+          <p:cNvSpPr>
+            <a:spLocks noGrp="1"/>
+          </p:cNvSpPr>
+          <p:nvPr>
+            <p:ph type="body" idx="1"/>
+          </p:nvPr>
+        </p:nvSpPr>
+        <p:spPr/>
+        <p:txBody>
+          <a:bodyPr/>
+          <a:lstStyle/>
+          <a:p>
+            <a:r>
+              <a:rPr lang="en-US" u="sng" dirty="0" smtClean="0"/>
+              <a:t>RDBMS</a:t>
+            </a:r>
+            <a:endParaRPr lang="bg-BG" u="sng" dirty="0"/>
+          </a:p>
+        </p:txBody>
+      </p:sp>
+      <p:sp>
+        <p:nvSpPr>
+          <p:cNvPr id="4" name="Rounded Rectangle 3"/>
+          <p:cNvSpPr/>
+          <p:nvPr/>
+        </p:nvSpPr>
+        <p:spPr>
+          <a:xfrm>
+            <a:off x="2601156" y="3613212"/>
+            <a:ext cx="1944210" cy="683581"/>
+          </a:xfrm>
+          <a:prstGeom prst="roundRect">
+            <a:avLst/>
+          </a:prstGeom>
+          <a:solidFill>
+            <a:schemeClr val="tx1">
+              <a:lumMod val="65000"/>
+              <a:lumOff val="35000"/>
+            </a:schemeClr>
+          </a:solidFill>
+          <a:ln w="19050">
+            <a:solidFill>
+              <a:schemeClr val="bg1"/>
+            </a:solidFill>
+          </a:ln>
+        </p:spPr>
+        <p:style>
+          <a:lnRef idx="2">
+            <a:schemeClr val="accent1">
+              <a:shade val="50000"/>
+            </a:schemeClr>
+          </a:lnRef>
+          <a:fillRef idx="1">
+            <a:schemeClr val="accent1"/>
+          </a:fillRef>
+          <a:effectRef idx="0">
+            <a:schemeClr val="accent1"/>
+          </a:effectRef>
+          <a:fontRef idx="minor">
+            <a:schemeClr val="lt1"/>
+          </a:fontRef>
+        </p:style>
+        <p:txBody>
+          <a:bodyPr rtlCol="0" anchor="ctr"/>
+          <a:lstStyle/>
+          <a:p>
+            <a:pPr algn="ctr"/>
+            <a:r>
+              <a:rPr lang="en-US" dirty="0" smtClean="0"/>
+              <a:t>User</a:t>
+            </a:r>
+            <a:endParaRPr lang="bg-BG" dirty="0"/>
+          </a:p>
+        </p:txBody>
+      </p:sp>
+      <p:sp>
+        <p:nvSpPr>
+          <p:cNvPr id="6" name="Rounded Rectangle 5"/>
+          <p:cNvSpPr/>
+          <p:nvPr/>
+        </p:nvSpPr>
+        <p:spPr>
+          <a:xfrm>
+            <a:off x="7831584" y="3613212"/>
+            <a:ext cx="1944210" cy="683581"/>
+          </a:xfrm>
+          <a:prstGeom prst="roundRect">
+            <a:avLst/>
+          </a:prstGeom>
+          <a:solidFill>
+            <a:srgbClr val="0070C0"/>
+          </a:solidFill>
+          <a:ln w="19050">
+            <a:solidFill>
+              <a:schemeClr val="bg1"/>
+            </a:solidFill>
+          </a:ln>
+        </p:spPr>
+        <p:style>
+          <a:lnRef idx="2">
+            <a:schemeClr val="accent1">
+              <a:shade val="50000"/>
+            </a:schemeClr>
+          </a:lnRef>
+          <a:fillRef idx="1">
+            <a:schemeClr val="accent1"/>
+          </a:fillRef>
+          <a:effectRef idx="0">
+            <a:schemeClr val="accent1"/>
+          </a:effectRef>
+          <a:fontRef idx="minor">
+            <a:schemeClr val="lt1"/>
+          </a:fontRef>
+        </p:style>
+        <p:txBody>
+          <a:bodyPr rtlCol="0" anchor="ctr"/>
+          <a:lstStyle/>
+          <a:p>
+            <a:pPr algn="ctr"/>
+            <a:r>
+              <a:rPr lang="en-US" dirty="0" smtClean="0"/>
+              <a:t>Hobbies</a:t>
+            </a:r>
+            <a:endParaRPr lang="bg-BG" dirty="0"/>
+          </a:p>
+        </p:txBody>
+      </p:sp>
+      <p:sp>
+        <p:nvSpPr>
+          <p:cNvPr id="7" name="Rounded Rectangle 6"/>
+          <p:cNvSpPr/>
+          <p:nvPr/>
+        </p:nvSpPr>
+        <p:spPr>
+          <a:xfrm>
+            <a:off x="2601156" y="5807476"/>
+            <a:ext cx="1944210" cy="683581"/>
+          </a:xfrm>
+          <a:prstGeom prst="roundRect">
+            <a:avLst/>
+          </a:prstGeom>
+          <a:solidFill>
+            <a:srgbClr val="0070C0"/>
+          </a:solidFill>
+          <a:ln w="19050">
+            <a:solidFill>
+              <a:schemeClr val="bg1"/>
+            </a:solidFill>
+          </a:ln>
+        </p:spPr>
+        <p:style>
+          <a:lnRef idx="2">
+            <a:schemeClr val="accent1">
+              <a:shade val="50000"/>
+            </a:schemeClr>
+          </a:lnRef>
+          <a:fillRef idx="1">
+            <a:schemeClr val="accent1"/>
+          </a:fillRef>
+          <a:effectRef idx="0">
+            <a:schemeClr val="accent1"/>
+          </a:effectRef>
+          <a:fontRef idx="minor">
+            <a:schemeClr val="lt1"/>
+          </a:fontRef>
+        </p:style>
+        <p:txBody>
+          <a:bodyPr rtlCol="0" anchor="ctr"/>
+          <a:lstStyle/>
+          <a:p>
+            <a:pPr algn="ctr"/>
+            <a:r>
+              <a:rPr lang="en-US" dirty="0" smtClean="0"/>
+              <a:t>Addresses</a:t>
+            </a:r>
+            <a:endParaRPr lang="bg-BG" dirty="0"/>
+          </a:p>
+        </p:txBody>
+      </p:sp>
+      <p:cxnSp>
+        <p:nvCxnSpPr>
+          <p:cNvPr id="9" name="Straight Arrow Connector 8"/>
+          <p:cNvCxnSpPr>
+            <a:stCxn id="4" idx="3"/>
+          </p:cNvCxnSpPr>
+          <p:nvPr/>
+        </p:nvCxnSpPr>
+        <p:spPr>
+          <a:xfrm flipV="1">
+            <a:off x="4545366" y="3955002"/>
+            <a:ext cx="3286218" cy="1"/>
+          </a:xfrm>
+          <a:prstGeom prst="straightConnector1">
+            <a:avLst/>
+          </a:prstGeom>
+          <a:ln>
+            <a:solidFill>
+              <a:schemeClr val="tx1"/>
+            </a:solidFill>
+            <a:prstDash val="dash"/>
+            <a:tailEnd type="triangle"/>
+          </a:ln>
+        </p:spPr>
+        <p:style>
+          <a:lnRef idx="1">
+            <a:schemeClr val="accent1"/>
+          </a:lnRef>
+          <a:fillRef idx="0">
+            <a:schemeClr val="accent1"/>
+          </a:fillRef>
+          <a:effectRef idx="0">
+            <a:schemeClr val="accent1"/>
+          </a:effectRef>
+          <a:fontRef idx="minor">
+            <a:schemeClr val="tx1"/>
+          </a:fontRef>
+        </p:style>
+      </p:cxnSp>
+      <p:cxnSp>
+        <p:nvCxnSpPr>
+          <p:cNvPr id="11" name="Straight Arrow Connector 10"/>
+          <p:cNvCxnSpPr>
+            <a:stCxn id="4" idx="2"/>
+            <a:endCxn id="7" idx="0"/>
+          </p:cNvCxnSpPr>
+          <p:nvPr/>
+        </p:nvCxnSpPr>
+        <p:spPr>
+          <a:xfrm>
+            <a:off x="3573261" y="4296793"/>
+            <a:ext cx="0" cy="1510683"/>
+          </a:xfrm>
+          <a:prstGeom prst="straightConnector1">
+            <a:avLst/>
+          </a:prstGeom>
+          <a:ln>
+            <a:solidFill>
+              <a:schemeClr val="tx1"/>
+            </a:solidFill>
+            <a:prstDash val="dash"/>
+            <a:tailEnd type="triangle"/>
+          </a:ln>
+        </p:spPr>
+        <p:style>
+          <a:lnRef idx="1">
+            <a:schemeClr val="accent1"/>
+          </a:lnRef>
+          <a:fillRef idx="0">
+            <a:schemeClr val="accent1"/>
+          </a:fillRef>
+          <a:effectRef idx="0">
+            <a:schemeClr val="accent1"/>
+          </a:effectRef>
+          <a:fontRef idx="minor">
+            <a:schemeClr val="tx1"/>
+          </a:fontRef>
+        </p:style>
+      </p:cxnSp>
+    </p:spTree>
+    <p:extLst>
+      <p:ext uri="{BB962C8B-B14F-4D97-AF65-F5344CB8AC3E}">
+        <p14:creationId xmlns:p14="http://schemas.microsoft.com/office/powerpoint/2010/main" val="3860067870"/>
+      </p:ext>
+    </p:extLst>
+  </p:cSld>
+  <p:clrMapOvr>
+    <a:masterClrMapping/>
+  </p:clrMapOvr>
+  <p:timing>
+    <p:tnLst>
+      <p:par>
+        <p:cTn id="1" dur="indefinite" restart="never" nodeType="tmRoot"/>
+      </p:par>
+    </p:tnLst>
+  </p:timing>
+</p:sld>
+</file>
+
+<file path=ppt/slides/slide12.xml><?xml version="1.0" encoding="utf-8"?>
+<p:sld xmlns:a="http://schemas.openxmlformats.org/drawingml/2006/main" xmlns:r="http://schemas.openxmlformats.org/officeDocument/2006/relationships" xmlns:p="http://schemas.openxmlformats.org/presentationml/2006/main">
+  <p:cSld>
+    <p:spTree>
+      <p:nvGrpSpPr>
+        <p:cNvPr id="1" name=""/>
+        <p:cNvGrpSpPr/>
+        <p:nvPr/>
+      </p:nvGrpSpPr>
+      <p:grpSpPr>
+        <a:xfrm>
+          <a:off x="0" y="0"/>
+          <a:ext cx="0" cy="0"/>
+          <a:chOff x="0" y="0"/>
+          <a:chExt cx="0" cy="0"/>
+        </a:xfrm>
+      </p:grpSpPr>
+      <p:sp>
+        <p:nvSpPr>
+          <p:cNvPr id="2" name="Title 1"/>
+          <p:cNvSpPr>
+            <a:spLocks noGrp="1"/>
+          </p:cNvSpPr>
+          <p:nvPr>
+            <p:ph type="title"/>
+          </p:nvPr>
+        </p:nvSpPr>
+        <p:spPr/>
+        <p:txBody>
+          <a:bodyPr/>
+          <a:lstStyle/>
+          <a:p>
+            <a:r>
+              <a:rPr lang="en-US" b="1" u="sng" dirty="0"/>
+              <a:t>Non-relational &amp; </a:t>
+            </a:r>
+            <a:r>
+              <a:rPr lang="en-US" b="1" u="sng" dirty="0" smtClean="0"/>
+              <a:t>Schema-less</a:t>
+            </a:r>
+            <a:endParaRPr lang="bg-BG" b="1" u="sng" dirty="0"/>
+          </a:p>
+        </p:txBody>
+      </p:sp>
+      <p:sp>
+        <p:nvSpPr>
+          <p:cNvPr id="12" name="Text Placeholder 11"/>
+          <p:cNvSpPr>
+            <a:spLocks noGrp="1"/>
+          </p:cNvSpPr>
+          <p:nvPr>
+            <p:ph type="body" idx="1"/>
+          </p:nvPr>
+        </p:nvSpPr>
+        <p:spPr/>
+        <p:txBody>
+          <a:bodyPr/>
+          <a:lstStyle/>
+          <a:p>
+            <a:r>
+              <a:rPr lang="en-US" u="sng" dirty="0" smtClean="0"/>
+              <a:t>Non-Relational Data Model</a:t>
+            </a:r>
+            <a:endParaRPr lang="bg-BG" u="sng" dirty="0"/>
+          </a:p>
+        </p:txBody>
+      </p:sp>
+      <p:sp>
+        <p:nvSpPr>
+          <p:cNvPr id="13" name="Content Placeholder 12"/>
+          <p:cNvSpPr>
+            <a:spLocks noGrp="1"/>
+          </p:cNvSpPr>
+          <p:nvPr>
+            <p:ph sz="quarter" idx="4"/>
+          </p:nvPr>
+        </p:nvSpPr>
+        <p:spPr/>
+        <p:txBody>
+          <a:bodyPr>
+            <a:normAutofit/>
+          </a:bodyPr>
+          <a:lstStyle/>
+          <a:p>
+            <a:r>
+              <a:rPr lang="en-US" sz="3200" dirty="0" smtClean="0"/>
+              <a:t>With </a:t>
+            </a:r>
+            <a:r>
+              <a:rPr lang="en-US" sz="3200" dirty="0" err="1" smtClean="0"/>
+              <a:t>MonogDB</a:t>
+            </a:r>
+            <a:r>
+              <a:rPr lang="en-US" sz="3200" dirty="0" smtClean="0"/>
+              <a:t> we can store related content in the same document</a:t>
+            </a:r>
+            <a:endParaRPr lang="bg-BG" sz="3200" dirty="0"/>
+          </a:p>
+        </p:txBody>
+      </p:sp>
+      <p:sp>
+        <p:nvSpPr>
+          <p:cNvPr id="4" name="Rounded Rectangle 3"/>
+          <p:cNvSpPr/>
+          <p:nvPr/>
+        </p:nvSpPr>
+        <p:spPr>
+          <a:xfrm>
+            <a:off x="1811043" y="3333940"/>
+            <a:ext cx="3524436" cy="3160450"/>
+          </a:xfrm>
+          <a:prstGeom prst="roundRect">
+            <a:avLst/>
+          </a:prstGeom>
+          <a:solidFill>
+            <a:schemeClr val="tx1">
+              <a:lumMod val="65000"/>
+              <a:lumOff val="35000"/>
+            </a:schemeClr>
+          </a:solidFill>
+          <a:ln w="19050">
+            <a:solidFill>
+              <a:schemeClr val="bg1"/>
+            </a:solidFill>
+          </a:ln>
+        </p:spPr>
+        <p:style>
+          <a:lnRef idx="2">
+            <a:schemeClr val="accent1">
+              <a:shade val="50000"/>
+            </a:schemeClr>
+          </a:lnRef>
+          <a:fillRef idx="1">
+            <a:schemeClr val="accent1"/>
+          </a:fillRef>
+          <a:effectRef idx="0">
+            <a:schemeClr val="accent1"/>
+          </a:effectRef>
+          <a:fontRef idx="minor">
+            <a:schemeClr val="lt1"/>
+          </a:fontRef>
+        </p:style>
+        <p:txBody>
+          <a:bodyPr rtlCol="0" anchor="t" anchorCtr="0"/>
+          <a:lstStyle/>
+          <a:p>
+            <a:pPr algn="ctr"/>
+            <a:r>
+              <a:rPr lang="en-US" dirty="0" smtClean="0"/>
+              <a:t>User</a:t>
+            </a:r>
+            <a:endParaRPr lang="bg-BG" dirty="0"/>
+          </a:p>
+        </p:txBody>
+      </p:sp>
+      <p:sp>
+        <p:nvSpPr>
+          <p:cNvPr id="6" name="Rounded Rectangle 5"/>
+          <p:cNvSpPr/>
+          <p:nvPr/>
+        </p:nvSpPr>
+        <p:spPr>
+          <a:xfrm>
+            <a:off x="2601156" y="4299008"/>
+            <a:ext cx="1944210" cy="683581"/>
+          </a:xfrm>
+          <a:prstGeom prst="roundRect">
+            <a:avLst/>
+          </a:prstGeom>
+          <a:solidFill>
+            <a:srgbClr val="0070C0"/>
+          </a:solidFill>
+          <a:ln w="19050">
+            <a:solidFill>
+              <a:schemeClr val="bg1"/>
+            </a:solidFill>
+          </a:ln>
+        </p:spPr>
+        <p:style>
+          <a:lnRef idx="2">
+            <a:schemeClr val="accent1">
+              <a:shade val="50000"/>
+            </a:schemeClr>
+          </a:lnRef>
+          <a:fillRef idx="1">
+            <a:schemeClr val="accent1"/>
+          </a:fillRef>
+          <a:effectRef idx="0">
+            <a:schemeClr val="accent1"/>
+          </a:effectRef>
+          <a:fontRef idx="minor">
+            <a:schemeClr val="lt1"/>
+          </a:fontRef>
+        </p:style>
+        <p:txBody>
+          <a:bodyPr rtlCol="0" anchor="ctr"/>
+          <a:lstStyle/>
+          <a:p>
+            <a:pPr algn="ctr"/>
+            <a:r>
+              <a:rPr lang="en-US" dirty="0" smtClean="0"/>
+              <a:t>Hobbies</a:t>
+            </a:r>
+            <a:endParaRPr lang="bg-BG" dirty="0"/>
+          </a:p>
+        </p:txBody>
+      </p:sp>
+      <p:sp>
+        <p:nvSpPr>
+          <p:cNvPr id="7" name="Rounded Rectangle 6"/>
+          <p:cNvSpPr/>
+          <p:nvPr/>
+        </p:nvSpPr>
+        <p:spPr>
+          <a:xfrm>
+            <a:off x="2601156" y="5443492"/>
+            <a:ext cx="1944210" cy="683581"/>
+          </a:xfrm>
+          <a:prstGeom prst="roundRect">
+            <a:avLst/>
+          </a:prstGeom>
+          <a:solidFill>
+            <a:srgbClr val="0070C0"/>
+          </a:solidFill>
+          <a:ln w="19050">
+            <a:solidFill>
+              <a:schemeClr val="bg1"/>
+            </a:solidFill>
+          </a:ln>
+        </p:spPr>
+        <p:style>
+          <a:lnRef idx="2">
+            <a:schemeClr val="accent1">
+              <a:shade val="50000"/>
+            </a:schemeClr>
+          </a:lnRef>
+          <a:fillRef idx="1">
+            <a:schemeClr val="accent1"/>
+          </a:fillRef>
+          <a:effectRef idx="0">
+            <a:schemeClr val="accent1"/>
+          </a:effectRef>
+          <a:fontRef idx="minor">
+            <a:schemeClr val="lt1"/>
+          </a:fontRef>
+        </p:style>
+        <p:txBody>
+          <a:bodyPr rtlCol="0" anchor="ctr"/>
+          <a:lstStyle/>
+          <a:p>
+            <a:pPr algn="ctr"/>
+            <a:r>
+              <a:rPr lang="en-US" dirty="0" smtClean="0"/>
+              <a:t>Addresses</a:t>
+            </a:r>
+            <a:endParaRPr lang="bg-BG" dirty="0"/>
+          </a:p>
+        </p:txBody>
+      </p:sp>
+    </p:spTree>
+    <p:extLst>
+      <p:ext uri="{BB962C8B-B14F-4D97-AF65-F5344CB8AC3E}">
+        <p14:creationId xmlns:p14="http://schemas.microsoft.com/office/powerpoint/2010/main" val="2555674077"/>
+      </p:ext>
+    </p:extLst>
+  </p:cSld>
+  <p:clrMapOvr>
+    <a:masterClrMapping/>
+  </p:clrMapOvr>
+  <p:timing>
+    <p:tnLst>
+      <p:par>
+        <p:cTn id="1" dur="indefinite" restart="never" nodeType="tmRoot"/>
+      </p:par>
+    </p:tnLst>
+  </p:timing>
+</p:sld>
+</file>
+
+<file path=ppt/slides/slide13.xml><?xml version="1.0" encoding="utf-8"?>
+<p:sld xmlns:a="http://schemas.openxmlformats.org/drawingml/2006/main" xmlns:r="http://schemas.openxmlformats.org/officeDocument/2006/relationships" xmlns:p="http://schemas.openxmlformats.org/presentationml/2006/main">
+  <p:cSld>
+    <p:spTree>
+      <p:nvGrpSpPr>
+        <p:cNvPr id="1" name=""/>
+        <p:cNvGrpSpPr/>
+        <p:nvPr/>
+      </p:nvGrpSpPr>
+      <p:grpSpPr>
+        <a:xfrm>
+          <a:off x="0" y="0"/>
+          <a:ext cx="0" cy="0"/>
+          <a:chOff x="0" y="0"/>
+          <a:chExt cx="0" cy="0"/>
+        </a:xfrm>
+      </p:grpSpPr>
+      <p:sp>
+        <p:nvSpPr>
+          <p:cNvPr id="2" name="Title 1"/>
+          <p:cNvSpPr>
+            <a:spLocks noGrp="1"/>
+          </p:cNvSpPr>
+          <p:nvPr>
+            <p:ph type="title"/>
+          </p:nvPr>
+        </p:nvSpPr>
+        <p:spPr/>
+        <p:txBody>
+          <a:bodyPr/>
+          <a:lstStyle/>
+          <a:p>
+            <a:r>
+              <a:rPr lang="en-US" b="1" u="sng" dirty="0">
+                <a:solidFill>
+                  <a:schemeClr val="tx1"/>
+                </a:solidFill>
+              </a:rPr>
+              <a:t>Full featured</a:t>
+            </a:r>
+            <a:endParaRPr lang="bg-BG" b="1" u="sng" dirty="0">
+              <a:solidFill>
+                <a:schemeClr val="tx1"/>
+              </a:solidFill>
+            </a:endParaRPr>
+          </a:p>
+        </p:txBody>
+      </p:sp>
+      <p:sp>
+        <p:nvSpPr>
+          <p:cNvPr id="3" name="Text Placeholder 2"/>
+          <p:cNvSpPr>
+            <a:spLocks noGrp="1"/>
+          </p:cNvSpPr>
+          <p:nvPr>
+            <p:ph type="body" idx="1"/>
+          </p:nvPr>
+        </p:nvSpPr>
+        <p:spPr/>
+        <p:txBody>
+          <a:bodyPr/>
+          <a:lstStyle/>
+          <a:p>
+            <a:r>
+              <a:rPr lang="en-US" sz="3200" u="sng" dirty="0" smtClean="0"/>
+              <a:t>Geospatial features</a:t>
+            </a:r>
+            <a:endParaRPr lang="bg-BG" sz="3200" u="sng" dirty="0"/>
+          </a:p>
+        </p:txBody>
+      </p:sp>
+      <p:sp>
+        <p:nvSpPr>
+          <p:cNvPr id="4" name="Content Placeholder 3"/>
+          <p:cNvSpPr>
+            <a:spLocks noGrp="1"/>
+          </p:cNvSpPr>
+          <p:nvPr>
+            <p:ph sz="half" idx="2"/>
+          </p:nvPr>
+        </p:nvSpPr>
+        <p:spPr>
+          <a:xfrm>
+            <a:off x="1371600" y="3305207"/>
+            <a:ext cx="9601200" cy="2562193"/>
+          </a:xfrm>
+        </p:spPr>
+        <p:txBody>
+          <a:bodyPr>
+            <a:normAutofit lnSpcReduction="10000"/>
+          </a:bodyPr>
+          <a:lstStyle/>
+          <a:p>
+            <a:r>
+              <a:rPr lang="en-US" sz="3200" dirty="0" smtClean="0"/>
+              <a:t>Geospatial indexes to support geographic data </a:t>
+            </a:r>
+            <a:r>
+              <a:rPr lang="en-US" sz="3200" dirty="0" err="1" smtClean="0"/>
+              <a:t>scructures</a:t>
+            </a:r>
+            <a:endParaRPr lang="en-US" sz="3200" dirty="0" smtClean="0"/>
+          </a:p>
+          <a:p>
+            <a:r>
+              <a:rPr lang="en-US" sz="3200" dirty="0" err="1" smtClean="0"/>
+              <a:t>GeoJson</a:t>
+            </a:r>
+            <a:endParaRPr lang="en-US" sz="3200" dirty="0"/>
+          </a:p>
+          <a:p>
+            <a:r>
+              <a:rPr lang="en-US" sz="3200" dirty="0" smtClean="0"/>
+              <a:t>2d support for Flat/ Euclidean place </a:t>
+            </a:r>
+            <a:r>
+              <a:rPr lang="en-US" sz="3200" dirty="0" err="1" smtClean="0"/>
+              <a:t>disctance</a:t>
+            </a:r>
+            <a:r>
+              <a:rPr lang="en-US" sz="3200" dirty="0" smtClean="0"/>
+              <a:t> calculation</a:t>
+            </a:r>
+            <a:endParaRPr lang="bg-BG" sz="3200" dirty="0"/>
+          </a:p>
+        </p:txBody>
+      </p:sp>
+    </p:spTree>
+    <p:extLst>
+      <p:ext uri="{BB962C8B-B14F-4D97-AF65-F5344CB8AC3E}">
+        <p14:creationId xmlns:p14="http://schemas.microsoft.com/office/powerpoint/2010/main" val="4019074559"/>
+      </p:ext>
+    </p:extLst>
+  </p:cSld>
+  <p:clrMapOvr>
+    <a:masterClrMapping/>
+  </p:clrMapOvr>
+  <p:timing>
+    <p:tnLst>
+      <p:par>
+        <p:cTn id="1" dur="indefinite" restart="never" nodeType="tmRoot"/>
+      </p:par>
+    </p:tnLst>
+  </p:timing>
+</p:sld>
+</file>
+
+<file path=ppt/slides/slide14.xml><?xml version="1.0" encoding="utf-8"?>
+<p:sld xmlns:a="http://schemas.openxmlformats.org/drawingml/2006/main" xmlns:r="http://schemas.openxmlformats.org/officeDocument/2006/relationships" xmlns:p="http://schemas.openxmlformats.org/presentationml/2006/main">
+  <p:cSld>
+    <p:spTree>
+      <p:nvGrpSpPr>
+        <p:cNvPr id="1" name=""/>
+        <p:cNvGrpSpPr/>
+        <p:nvPr/>
+      </p:nvGrpSpPr>
+      <p:grpSpPr>
+        <a:xfrm>
+          <a:off x="0" y="0"/>
+          <a:ext cx="0" cy="0"/>
+          <a:chOff x="0" y="0"/>
+          <a:chExt cx="0" cy="0"/>
+        </a:xfrm>
+      </p:grpSpPr>
+      <p:sp>
+        <p:nvSpPr>
+          <p:cNvPr id="2" name="Title 1"/>
+          <p:cNvSpPr>
+            <a:spLocks noGrp="1"/>
+          </p:cNvSpPr>
+          <p:nvPr>
+            <p:ph type="title"/>
+          </p:nvPr>
+        </p:nvSpPr>
+        <p:spPr/>
+        <p:txBody>
+          <a:bodyPr/>
+          <a:lstStyle/>
+          <a:p>
+            <a:r>
+              <a:rPr lang="en-US" b="1" u="sng" dirty="0">
+                <a:solidFill>
+                  <a:schemeClr val="tx1"/>
+                </a:solidFill>
+              </a:rPr>
+              <a:t>Full featured</a:t>
+            </a:r>
+            <a:endParaRPr lang="bg-BG" b="1" u="sng" dirty="0">
+              <a:solidFill>
+                <a:schemeClr val="tx1"/>
+              </a:solidFill>
+            </a:endParaRPr>
+          </a:p>
+        </p:txBody>
+      </p:sp>
+      <p:sp>
+        <p:nvSpPr>
+          <p:cNvPr id="3" name="Text Placeholder 2"/>
+          <p:cNvSpPr>
+            <a:spLocks noGrp="1"/>
+          </p:cNvSpPr>
+          <p:nvPr>
+            <p:ph type="body" idx="1"/>
+          </p:nvPr>
+        </p:nvSpPr>
+        <p:spPr/>
+        <p:txBody>
+          <a:bodyPr/>
+          <a:lstStyle/>
+          <a:p>
+            <a:r>
+              <a:rPr lang="en-US" sz="3200" u="sng" dirty="0"/>
+              <a:t>Management </a:t>
+            </a:r>
+            <a:r>
+              <a:rPr lang="en-US" sz="3200" u="sng" dirty="0" smtClean="0"/>
+              <a:t>Service</a:t>
+            </a:r>
+            <a:endParaRPr lang="bg-BG" sz="3200" u="sng" dirty="0"/>
+          </a:p>
+        </p:txBody>
+      </p:sp>
+      <p:sp>
+        <p:nvSpPr>
+          <p:cNvPr id="4" name="Content Placeholder 3"/>
+          <p:cNvSpPr>
+            <a:spLocks noGrp="1"/>
+          </p:cNvSpPr>
+          <p:nvPr>
+            <p:ph sz="half" idx="2"/>
+          </p:nvPr>
+        </p:nvSpPr>
+        <p:spPr>
+          <a:xfrm>
+            <a:off x="1371600" y="3305207"/>
+            <a:ext cx="9597398" cy="2562193"/>
+          </a:xfrm>
+        </p:spPr>
+        <p:txBody>
+          <a:bodyPr>
+            <a:noAutofit/>
+          </a:bodyPr>
+          <a:lstStyle/>
+          <a:p>
+            <a:r>
+              <a:rPr lang="en-US" sz="3200" dirty="0"/>
+              <a:t>Service status monitoring</a:t>
+            </a:r>
+          </a:p>
+          <a:p>
+            <a:r>
+              <a:rPr lang="en-US" sz="3200" dirty="0"/>
+              <a:t>Custom, metrics-based alert</a:t>
+            </a:r>
+          </a:p>
+          <a:p>
+            <a:r>
+              <a:rPr lang="en-US" sz="3200" dirty="0"/>
+              <a:t>Fully managed backups</a:t>
+            </a:r>
+          </a:p>
+          <a:p>
+            <a:r>
+              <a:rPr lang="en-US" sz="3200" dirty="0" smtClean="0"/>
+              <a:t>…</a:t>
+            </a:r>
+            <a:endParaRPr lang="bg-BG" sz="3200" dirty="0"/>
+          </a:p>
+        </p:txBody>
+      </p:sp>
+    </p:spTree>
+    <p:extLst>
+      <p:ext uri="{BB962C8B-B14F-4D97-AF65-F5344CB8AC3E}">
+        <p14:creationId xmlns:p14="http://schemas.microsoft.com/office/powerpoint/2010/main" val="243443230"/>
+      </p:ext>
+    </p:extLst>
+  </p:cSld>
+  <p:clrMapOvr>
+    <a:masterClrMapping/>
+  </p:clrMapOvr>
+  <p:timing>
+    <p:tnLst>
+      <p:par>
+        <p:cTn id="1" dur="indefinite" restart="never" nodeType="tmRoot"/>
+      </p:par>
+    </p:tnLst>
+  </p:timing>
+</p:sld>
+</file>
+
+<file path=ppt/slides/slide15.xml><?xml version="1.0" encoding="utf-8"?>
+<p:sld xmlns:a="http://schemas.openxmlformats.org/drawingml/2006/main" xmlns:r="http://schemas.openxmlformats.org/officeDocument/2006/relationships" xmlns:p="http://schemas.openxmlformats.org/presentationml/2006/main">
+  <p:cSld>
+    <p:spTree>
+      <p:nvGrpSpPr>
+        <p:cNvPr id="1" name=""/>
+        <p:cNvGrpSpPr/>
+        <p:nvPr/>
+      </p:nvGrpSpPr>
+      <p:grpSpPr>
+        <a:xfrm>
+          <a:off x="0" y="0"/>
+          <a:ext cx="0" cy="0"/>
+          <a:chOff x="0" y="0"/>
+          <a:chExt cx="0" cy="0"/>
+        </a:xfrm>
+      </p:grpSpPr>
+      <p:sp>
+        <p:nvSpPr>
+          <p:cNvPr id="2" name="Title 1"/>
+          <p:cNvSpPr>
+            <a:spLocks noGrp="1"/>
+          </p:cNvSpPr>
+          <p:nvPr>
+            <p:ph type="title"/>
+          </p:nvPr>
+        </p:nvSpPr>
+        <p:spPr/>
+        <p:txBody>
+          <a:bodyPr/>
+          <a:lstStyle/>
+          <a:p>
+            <a:r>
+              <a:rPr lang="en-US" b="1" u="sng" dirty="0" smtClean="0"/>
+              <a:t>How to use </a:t>
+            </a:r>
+            <a:r>
+              <a:rPr lang="en-US" b="1" u="sng" dirty="0" err="1" smtClean="0"/>
+              <a:t>mongoDB</a:t>
+            </a:r>
+            <a:r>
+              <a:rPr lang="en-US" b="1" u="sng" dirty="0" smtClean="0"/>
+              <a:t> with </a:t>
+            </a:r>
+            <a:r>
+              <a:rPr lang="en-US" b="1" u="sng" dirty="0" err="1" smtClean="0"/>
+              <a:t>NodeJS</a:t>
+            </a:r>
+            <a:r>
+              <a:rPr lang="en-US" b="1" u="sng" dirty="0"/>
+              <a:t>?</a:t>
+            </a:r>
+            <a:endParaRPr lang="bg-BG" b="1" u="sng" dirty="0"/>
+          </a:p>
+        </p:txBody>
+      </p:sp>
+      <p:sp>
+        <p:nvSpPr>
+          <p:cNvPr id="3" name="Content Placeholder 2"/>
+          <p:cNvSpPr>
+            <a:spLocks noGrp="1"/>
+          </p:cNvSpPr>
+          <p:nvPr>
+            <p:ph idx="1"/>
+          </p:nvPr>
+        </p:nvSpPr>
+        <p:spPr/>
+        <p:txBody>
+          <a:bodyPr>
+            <a:noAutofit/>
+          </a:bodyPr>
+          <a:lstStyle/>
+          <a:p>
+            <a:r>
+              <a:rPr lang="en-US" sz="3200" dirty="0" smtClean="0"/>
+              <a:t>Mongoose</a:t>
+            </a:r>
+          </a:p>
+          <a:p>
+            <a:r>
+              <a:rPr lang="en-US" sz="3200" dirty="0" err="1" smtClean="0"/>
+              <a:t>MongoJS</a:t>
+            </a:r>
+            <a:endParaRPr lang="bg-BG" sz="3200" dirty="0"/>
+          </a:p>
+        </p:txBody>
+      </p:sp>
+    </p:spTree>
+    <p:extLst>
+      <p:ext uri="{BB962C8B-B14F-4D97-AF65-F5344CB8AC3E}">
+        <p14:creationId xmlns:p14="http://schemas.microsoft.com/office/powerpoint/2010/main" val="3356788309"/>
+      </p:ext>
+    </p:extLst>
+  </p:cSld>
+  <p:clrMapOvr>
+    <a:masterClrMapping/>
+  </p:clrMapOvr>
+  <p:timing>
+    <p:tnLst>
+      <p:par>
+        <p:cTn id="1" dur="indefinite" restart="never" nodeType="tmRoot"/>
+      </p:par>
+    </p:tnLst>
+  </p:timing>
+</p:sld>
+</file>
+
+<file path=ppt/slides/slide16.xml><?xml version="1.0" encoding="utf-8"?>
+<p:sld xmlns:a="http://schemas.openxmlformats.org/drawingml/2006/main" xmlns:r="http://schemas.openxmlformats.org/officeDocument/2006/relationships" xmlns:p="http://schemas.openxmlformats.org/presentationml/2006/main">
+  <p:cSld>
+    <p:bg>
+      <p:bgPr>
+        <a:solidFill>
+          <a:srgbClr val="0070C0"/>
+        </a:solidFill>
+        <a:effectLst/>
+      </p:bgPr>
+    </p:bg>
+    <p:spTree>
+      <p:nvGrpSpPr>
+        <p:cNvPr id="1" name=""/>
+        <p:cNvGrpSpPr/>
+        <p:nvPr/>
+      </p:nvGrpSpPr>
+      <p:grpSpPr>
+        <a:xfrm>
+          <a:off x="0" y="0"/>
+          <a:ext cx="0" cy="0"/>
+          <a:chOff x="0" y="0"/>
+          <a:chExt cx="0" cy="0"/>
+        </a:xfrm>
+      </p:grpSpPr>
+      <p:sp>
+        <p:nvSpPr>
+          <p:cNvPr id="2" name="Title 1"/>
+          <p:cNvSpPr>
+            <a:spLocks noGrp="1"/>
+          </p:cNvSpPr>
+          <p:nvPr>
+            <p:ph type="title"/>
+          </p:nvPr>
+        </p:nvSpPr>
+        <p:spPr/>
+        <p:txBody>
+          <a:bodyPr/>
+          <a:lstStyle/>
+          <a:p>
+            <a:r>
+              <a:rPr lang="en-US" b="1" u="sng" dirty="0" err="1" smtClean="0">
+                <a:solidFill>
+                  <a:schemeClr val="bg1"/>
+                </a:solidFill>
+              </a:rPr>
+              <a:t>MongoJS</a:t>
+            </a:r>
+            <a:endParaRPr lang="bg-BG" b="1" u="sng" dirty="0">
+              <a:solidFill>
+                <a:schemeClr val="bg1"/>
+              </a:solidFill>
+            </a:endParaRPr>
+          </a:p>
+        </p:txBody>
+      </p:sp>
+      <p:sp>
+        <p:nvSpPr>
+          <p:cNvPr id="3" name="Content Placeholder 2"/>
+          <p:cNvSpPr>
+            <a:spLocks noGrp="1"/>
+          </p:cNvSpPr>
+          <p:nvPr>
+            <p:ph idx="1"/>
+          </p:nvPr>
+        </p:nvSpPr>
+        <p:spPr>
+          <a:xfrm>
+            <a:off x="1371600" y="2286000"/>
+            <a:ext cx="9601200" cy="3581400"/>
+          </a:xfrm>
+        </p:spPr>
+        <p:txBody>
+          <a:bodyPr>
+            <a:normAutofit/>
+          </a:bodyPr>
+          <a:lstStyle/>
+          <a:p>
+            <a:r>
+              <a:rPr lang="en-US" sz="3200" dirty="0">
+                <a:solidFill>
+                  <a:schemeClr val="bg1"/>
+                </a:solidFill>
+              </a:rPr>
+              <a:t>The official MongoDB Node.js driver provides both callback based as well as Promised based interaction with MongoDB allowing applications to take full advantage of the new features in ES6. The 2.x series of the driver is powered by a brand new core driver and </a:t>
+            </a:r>
+            <a:r>
+              <a:rPr lang="en-US" sz="3200" dirty="0" err="1">
+                <a:solidFill>
+                  <a:schemeClr val="bg1"/>
+                </a:solidFill>
+              </a:rPr>
+              <a:t>bson</a:t>
+            </a:r>
+            <a:r>
+              <a:rPr lang="en-US" sz="3200" dirty="0">
+                <a:solidFill>
+                  <a:schemeClr val="bg1"/>
+                </a:solidFill>
+              </a:rPr>
+              <a:t> library.</a:t>
+            </a:r>
+            <a:endParaRPr lang="bg-BG" sz="3200" dirty="0">
+              <a:solidFill>
+                <a:schemeClr val="bg1"/>
+              </a:solidFill>
+            </a:endParaRPr>
+          </a:p>
+        </p:txBody>
+      </p:sp>
+    </p:spTree>
+    <p:extLst>
+      <p:ext uri="{BB962C8B-B14F-4D97-AF65-F5344CB8AC3E}">
+        <p14:creationId xmlns:p14="http://schemas.microsoft.com/office/powerpoint/2010/main" val="1651006220"/>
+      </p:ext>
+    </p:extLst>
+  </p:cSld>
+  <p:clrMapOvr>
+    <a:masterClrMapping/>
+  </p:clrMapOvr>
+  <p:timing>
+    <p:tnLst>
+      <p:par>
+        <p:cTn id="1" dur="indefinite" restart="never" nodeType="tmRoot"/>
+      </p:par>
+    </p:tnLst>
+  </p:timing>
+</p:sld>
+</file>
+
+<file path=ppt/slides/slide17.xml><?xml version="1.0" encoding="utf-8"?>
+<p:sld xmlns:a="http://schemas.openxmlformats.org/drawingml/2006/main" xmlns:r="http://schemas.openxmlformats.org/officeDocument/2006/relationships" xmlns:p="http://schemas.openxmlformats.org/presentationml/2006/main">
+  <p:cSld>
+    <p:spTree>
+      <p:nvGrpSpPr>
+        <p:cNvPr id="1" name=""/>
+        <p:cNvGrpSpPr/>
+        <p:nvPr/>
+      </p:nvGrpSpPr>
+      <p:grpSpPr>
+        <a:xfrm>
+          <a:off x="0" y="0"/>
+          <a:ext cx="0" cy="0"/>
+          <a:chOff x="0" y="0"/>
+          <a:chExt cx="0" cy="0"/>
+        </a:xfrm>
+      </p:grpSpPr>
+      <p:sp>
+        <p:nvSpPr>
+          <p:cNvPr id="4" name="Title 3"/>
+          <p:cNvSpPr>
+            <a:spLocks noGrp="1"/>
+          </p:cNvSpPr>
+          <p:nvPr>
+            <p:ph type="title"/>
+          </p:nvPr>
+        </p:nvSpPr>
+        <p:spPr/>
+        <p:txBody>
+          <a:bodyPr/>
+          <a:lstStyle/>
+          <a:p>
+            <a:r>
+              <a:rPr lang="en-US" dirty="0" smtClean="0"/>
+              <a:t>Demo </a:t>
+            </a:r>
+            <a:r>
+              <a:rPr lang="en-US" dirty="0" err="1" smtClean="0"/>
+              <a:t>MongoJS</a:t>
+            </a:r>
+            <a:endParaRPr lang="bg-BG" dirty="0"/>
+          </a:p>
+        </p:txBody>
+      </p:sp>
+      <p:sp>
+        <p:nvSpPr>
+          <p:cNvPr id="5" name="Text Placeholder 4"/>
+          <p:cNvSpPr>
+            <a:spLocks noGrp="1"/>
+          </p:cNvSpPr>
+          <p:nvPr>
+            <p:ph type="body" idx="1"/>
+          </p:nvPr>
+        </p:nvSpPr>
+        <p:spPr/>
+        <p:txBody>
+          <a:bodyPr/>
+          <a:lstStyle/>
+          <a:p>
+            <a:r>
+              <a:rPr lang="en-US" dirty="0" smtClean="0"/>
+              <a:t>ex6</a:t>
+            </a:r>
+            <a:endParaRPr lang="bg-BG" dirty="0"/>
+          </a:p>
+        </p:txBody>
+      </p:sp>
+    </p:spTree>
+    <p:extLst>
+      <p:ext uri="{BB962C8B-B14F-4D97-AF65-F5344CB8AC3E}">
+        <p14:creationId xmlns:p14="http://schemas.microsoft.com/office/powerpoint/2010/main" val="3900361383"/>
+      </p:ext>
+    </p:extLst>
+  </p:cSld>
+  <p:clrMapOvr>
+    <a:masterClrMapping/>
+  </p:clrMapOvr>
+  <p:timing>
+    <p:tnLst>
+      <p:par>
+        <p:cTn id="1" dur="indefinite" restart="never" nodeType="tmRoot"/>
+      </p:par>
+    </p:tnLst>
+  </p:timing>
 </p:sld>
 </file>
 
 <file path=ppt/slides/slide2.xml><?xml version="1.0" encoding="utf-8"?>
+<p:sld xmlns:a="http://schemas.openxmlformats.org/drawingml/2006/main" xmlns:r="http://schemas.openxmlformats.org/officeDocument/2006/relationships" xmlns:p="http://schemas.openxmlformats.org/presentationml/2006/main">
+  <p:cSld>
+    <p:bg>
+      <p:bgPr>
+        <a:solidFill>
+          <a:srgbClr val="0070C0"/>
+        </a:solidFill>
+        <a:effectLst/>
+      </p:bgPr>
+    </p:bg>
+    <p:spTree>
+      <p:nvGrpSpPr>
+        <p:cNvPr id="1" name=""/>
+        <p:cNvGrpSpPr/>
+        <p:nvPr/>
+      </p:nvGrpSpPr>
+      <p:grpSpPr>
+        <a:xfrm>
+          <a:off x="0" y="0"/>
+          <a:ext cx="0" cy="0"/>
+          <a:chOff x="0" y="0"/>
+          <a:chExt cx="0" cy="0"/>
+        </a:xfrm>
+      </p:grpSpPr>
+      <p:sp>
+        <p:nvSpPr>
+          <p:cNvPr id="2" name="Title 1"/>
+          <p:cNvSpPr>
+            <a:spLocks noGrp="1"/>
+          </p:cNvSpPr>
+          <p:nvPr>
+            <p:ph type="title"/>
+          </p:nvPr>
+        </p:nvSpPr>
+        <p:spPr/>
+        <p:txBody>
+          <a:bodyPr/>
+          <a:lstStyle/>
+          <a:p>
+            <a:r>
+              <a:rPr lang="en-US" b="1" u="sng" dirty="0" smtClean="0">
+                <a:solidFill>
+                  <a:schemeClr val="bg1"/>
+                </a:solidFill>
+              </a:rPr>
+              <a:t>NoSQL</a:t>
+            </a:r>
+            <a:endParaRPr lang="bg-BG" b="1" u="sng" dirty="0">
+              <a:solidFill>
+                <a:schemeClr val="bg1"/>
+              </a:solidFill>
+            </a:endParaRPr>
+          </a:p>
+        </p:txBody>
+      </p:sp>
+      <p:sp>
+        <p:nvSpPr>
+          <p:cNvPr id="3" name="Content Placeholder 2"/>
+          <p:cNvSpPr>
+            <a:spLocks noGrp="1"/>
+          </p:cNvSpPr>
+          <p:nvPr>
+            <p:ph idx="1"/>
+          </p:nvPr>
+        </p:nvSpPr>
+        <p:spPr>
+          <a:xfrm>
+            <a:off x="1371600" y="2286000"/>
+            <a:ext cx="9601200" cy="3581400"/>
+          </a:xfrm>
+        </p:spPr>
+        <p:txBody>
+          <a:bodyPr>
+            <a:normAutofit/>
+          </a:bodyPr>
+          <a:lstStyle/>
+          <a:p>
+            <a:r>
+              <a:rPr lang="en-US" sz="3200" dirty="0" smtClean="0">
+                <a:solidFill>
+                  <a:schemeClr val="bg1"/>
+                </a:solidFill>
+              </a:rPr>
+              <a:t>Database </a:t>
+            </a:r>
+            <a:r>
+              <a:rPr lang="en-US" sz="3200" dirty="0">
+                <a:solidFill>
+                  <a:schemeClr val="bg1"/>
+                </a:solidFill>
+              </a:rPr>
+              <a:t>provides a mechanism for storage and retrieval of data which is modeled in means other than the tabular relations used in relational databases.</a:t>
+            </a:r>
+            <a:endParaRPr lang="bg-BG" sz="3200" dirty="0">
+              <a:solidFill>
+                <a:schemeClr val="bg1"/>
+              </a:solidFill>
+            </a:endParaRPr>
+          </a:p>
+        </p:txBody>
+      </p:sp>
+    </p:spTree>
+    <p:extLst>
+      <p:ext uri="{BB962C8B-B14F-4D97-AF65-F5344CB8AC3E}">
+        <p14:creationId xmlns:p14="http://schemas.microsoft.com/office/powerpoint/2010/main" val="1869702916"/>
+      </p:ext>
+    </p:extLst>
+  </p:cSld>
+  <p:clrMapOvr>
+    <a:masterClrMapping/>
+  </p:clrMapOvr>
+  <p:timing>
+    <p:tnLst>
+      <p:par>
+        <p:cTn id="1" dur="indefinite" restart="never" nodeType="tmRoot"/>
+      </p:par>
+    </p:tnLst>
+  </p:timing>
+</p:sld>
+</file>
+
+<file path=ppt/slides/slide3.xml><?xml version="1.0" encoding="utf-8"?>
+<p:sld xmlns:a="http://schemas.openxmlformats.org/drawingml/2006/main" xmlns:r="http://schemas.openxmlformats.org/officeDocument/2006/relationships" xmlns:p="http://schemas.openxmlformats.org/presentationml/2006/main">
+  <p:cSld>
+    <p:spTree>
+      <p:nvGrpSpPr>
+        <p:cNvPr id="1" name=""/>
+        <p:cNvGrpSpPr/>
+        <p:nvPr/>
+      </p:nvGrpSpPr>
+      <p:grpSpPr>
+        <a:xfrm>
+          <a:off x="0" y="0"/>
+          <a:ext cx="0" cy="0"/>
+          <a:chOff x="0" y="0"/>
+          <a:chExt cx="0" cy="0"/>
+        </a:xfrm>
+      </p:grpSpPr>
+      <p:sp>
+        <p:nvSpPr>
+          <p:cNvPr id="2" name="Title 1"/>
+          <p:cNvSpPr>
+            <a:spLocks noGrp="1"/>
+          </p:cNvSpPr>
+          <p:nvPr>
+            <p:ph type="title"/>
+          </p:nvPr>
+        </p:nvSpPr>
+        <p:spPr/>
+        <p:txBody>
+          <a:bodyPr/>
+          <a:lstStyle/>
+          <a:p>
+            <a:r>
+              <a:rPr lang="en-US" b="1" u="sng" dirty="0" smtClean="0"/>
+              <a:t>Types of NoSQL Databases</a:t>
+            </a:r>
+            <a:endParaRPr lang="bg-BG" b="1" u="sng" dirty="0"/>
+          </a:p>
+        </p:txBody>
+      </p:sp>
+      <p:sp>
+        <p:nvSpPr>
+          <p:cNvPr id="3" name="Content Placeholder 2"/>
+          <p:cNvSpPr>
+            <a:spLocks noGrp="1"/>
+          </p:cNvSpPr>
+          <p:nvPr>
+            <p:ph idx="1"/>
+          </p:nvPr>
+        </p:nvSpPr>
+        <p:spPr/>
+        <p:txBody>
+          <a:bodyPr>
+            <a:normAutofit/>
+          </a:bodyPr>
+          <a:lstStyle/>
+          <a:p>
+            <a:r>
+              <a:rPr lang="en-US" sz="3200" dirty="0" smtClean="0"/>
+              <a:t>Key-value stores</a:t>
+            </a:r>
+          </a:p>
+          <a:p>
+            <a:r>
+              <a:rPr lang="en-US" sz="3200" dirty="0" smtClean="0"/>
+              <a:t>Wide-column stores</a:t>
+            </a:r>
+          </a:p>
+          <a:p>
+            <a:r>
+              <a:rPr lang="en-US" sz="3200" dirty="0" smtClean="0"/>
+              <a:t>Document databases</a:t>
+            </a:r>
+          </a:p>
+          <a:p>
+            <a:r>
+              <a:rPr lang="en-US" sz="3200" dirty="0" smtClean="0"/>
+              <a:t>Graph databases</a:t>
+            </a:r>
+            <a:endParaRPr lang="bg-BG" sz="3200" dirty="0"/>
+          </a:p>
+        </p:txBody>
+      </p:sp>
+    </p:spTree>
+    <p:extLst>
+      <p:ext uri="{BB962C8B-B14F-4D97-AF65-F5344CB8AC3E}">
+        <p14:creationId xmlns:p14="http://schemas.microsoft.com/office/powerpoint/2010/main" val="835645549"/>
+      </p:ext>
+    </p:extLst>
+  </p:cSld>
+  <p:clrMapOvr>
+    <a:masterClrMapping/>
+  </p:clrMapOvr>
+  <p:timing>
+    <p:tnLst>
+      <p:par>
+        <p:cTn id="1" dur="indefinite" restart="never" nodeType="tmRoot"/>
+      </p:par>
+    </p:tnLst>
+  </p:timing>
+</p:sld>
+</file>
+
+<file path=ppt/slides/slide4.xml><?xml version="1.0" encoding="utf-8"?>
 <p:sld xmlns:a="http://schemas.openxmlformats.org/drawingml/2006/main" xmlns:r="http://schemas.openxmlformats.org/officeDocument/2006/relationships" xmlns:p="http://schemas.openxmlformats.org/presentationml/2006/main">
   <p:cSld>
     <p:spTree>
@@ -4461,10 +7123,17 @@
   <p:clrMapOvr>
     <a:masterClrMapping/>
   </p:clrMapOvr>
+  <p:timing>
+    <p:tnLst>
+      <p:par>
+        <p:cTn id="1" dur="indefinite" restart="never" nodeType="tmRoot"/>
+      </p:par>
+    </p:tnLst>
+  </p:timing>
 </p:sld>
 </file>
 
-<file path=ppt/slides/slide3.xml><?xml version="1.0" encoding="utf-8"?>
+<file path=ppt/slides/slide5.xml><?xml version="1.0" encoding="utf-8"?>
 <p:sld xmlns:a="http://schemas.openxmlformats.org/drawingml/2006/main" xmlns:r="http://schemas.openxmlformats.org/officeDocument/2006/relationships" xmlns:p="http://schemas.openxmlformats.org/presentationml/2006/main">
   <p:cSld>
     <p:spTree>
@@ -4535,8 +7204,8 @@
         </p:blipFill>
         <p:spPr>
           <a:xfrm>
-            <a:off x="0" y="0"/>
-            <a:ext cx="12192000" cy="6857999"/>
+            <a:off x="-1" y="0"/>
+            <a:ext cx="12192001" cy="6858000"/>
           </a:xfrm>
           <a:prstGeom prst="rect">
             <a:avLst/>
@@ -4546,17 +7215,123 @@
     </p:spTree>
     <p:extLst>
       <p:ext uri="{BB962C8B-B14F-4D97-AF65-F5344CB8AC3E}">
-        <p14:creationId xmlns:p14="http://schemas.microsoft.com/office/powerpoint/2010/main" val="1775766865"/>
+        <p14:creationId xmlns:p14="http://schemas.microsoft.com/office/powerpoint/2010/main" val="3487745023"/>
       </p:ext>
     </p:extLst>
   </p:cSld>
   <p:clrMapOvr>
     <a:masterClrMapping/>
   </p:clrMapOvr>
+  <p:timing>
+    <p:tnLst>
+      <p:par>
+        <p:cTn id="1" dur="indefinite" restart="never" nodeType="tmRoot"/>
+      </p:par>
+    </p:tnLst>
+  </p:timing>
 </p:sld>
 </file>
 
-<file path=ppt/slides/slide4.xml><?xml version="1.0" encoding="utf-8"?>
+<file path=ppt/slides/slide6.xml><?xml version="1.0" encoding="utf-8"?>
+<p:sld xmlns:a="http://schemas.openxmlformats.org/drawingml/2006/main" xmlns:r="http://schemas.openxmlformats.org/officeDocument/2006/relationships" xmlns:p="http://schemas.openxmlformats.org/presentationml/2006/main">
+  <p:cSld>
+    <p:spTree>
+      <p:nvGrpSpPr>
+        <p:cNvPr id="1" name=""/>
+        <p:cNvGrpSpPr/>
+        <p:nvPr/>
+      </p:nvGrpSpPr>
+      <p:grpSpPr>
+        <a:xfrm>
+          <a:off x="0" y="0"/>
+          <a:ext cx="0" cy="0"/>
+          <a:chOff x="0" y="0"/>
+          <a:chExt cx="0" cy="0"/>
+        </a:xfrm>
+      </p:grpSpPr>
+      <p:sp>
+        <p:nvSpPr>
+          <p:cNvPr id="2" name="Title 1"/>
+          <p:cNvSpPr>
+            <a:spLocks noGrp="1"/>
+          </p:cNvSpPr>
+          <p:nvPr>
+            <p:ph type="title"/>
+          </p:nvPr>
+        </p:nvSpPr>
+        <p:spPr/>
+        <p:txBody>
+          <a:bodyPr/>
+          <a:lstStyle/>
+          <a:p>
+            <a:endParaRPr lang="bg-BG"/>
+          </a:p>
+        </p:txBody>
+      </p:sp>
+      <p:sp>
+        <p:nvSpPr>
+          <p:cNvPr id="3" name="Content Placeholder 2"/>
+          <p:cNvSpPr>
+            <a:spLocks noGrp="1"/>
+          </p:cNvSpPr>
+          <p:nvPr>
+            <p:ph idx="1"/>
+          </p:nvPr>
+        </p:nvSpPr>
+        <p:spPr/>
+        <p:txBody>
+          <a:bodyPr/>
+          <a:lstStyle/>
+          <a:p>
+            <a:endParaRPr lang="bg-BG"/>
+          </a:p>
+        </p:txBody>
+      </p:sp>
+      <p:pic>
+        <p:nvPicPr>
+          <p:cNvPr id="4" name="Picture 3"/>
+          <p:cNvPicPr>
+            <a:picLocks noChangeAspect="1"/>
+          </p:cNvPicPr>
+          <p:nvPr/>
+        </p:nvPicPr>
+        <p:blipFill>
+          <a:blip r:embed="rId2"/>
+          <a:stretch>
+            <a:fillRect/>
+          </a:stretch>
+        </p:blipFill>
+        <p:spPr>
+          <a:xfrm>
+            <a:off x="1" y="0"/>
+            <a:ext cx="12192000" cy="6858000"/>
+          </a:xfrm>
+          <a:prstGeom prst="rect">
+            <a:avLst/>
+          </a:prstGeom>
+        </p:spPr>
+      </p:pic>
+    </p:spTree>
+    <p:extLst>
+      <p:ext uri="{BB962C8B-B14F-4D97-AF65-F5344CB8AC3E}">
+        <p14:creationId xmlns:p14="http://schemas.microsoft.com/office/powerpoint/2010/main" val="2062362637"/>
+      </p:ext>
+    </p:extLst>
+  </p:cSld>
+  <p:clrMapOvr>
+    <a:masterClrMapping/>
+  </p:clrMapOvr>
+  <p:timing>
+    <p:tnLst>
+      <p:par>
+        <p:cTn id="1" dur="indefinite" restart="never" nodeType="tmRoot"/>
+      </p:par>
+    </p:tnLst>
+  </p:timing>
+</p:sld>
+</file>
+
+<file path=ppt/slides/slide7.xml><?xml version="1.0" encoding="utf-8"?>
 <p:sld xmlns:a="http://schemas.openxmlformats.org/drawingml/2006/main" xmlns:r="http://schemas.openxmlformats.org/officeDocument/2006/relationships" xmlns:p="http://schemas.openxmlformats.org/presentationml/2006/main">
   <p:cSld>
     <p:bg>
@@ -4597,12 +7372,12 @@
           <a:lstStyle/>
           <a:p>
             <a:r>
-              <a:rPr lang="en-US" b="1" u="sng" dirty="0" err="1">
+              <a:rPr lang="en-US" b="1" u="sng" dirty="0" smtClean="0">
                 <a:solidFill>
                   <a:schemeClr val="bg1"/>
                 </a:solidFill>
               </a:rPr>
-              <a:t>NoSql</a:t>
+              <a:t>MongoDB is a…</a:t>
             </a:r>
             <a:endParaRPr lang="bg-BG" b="1" u="sng" dirty="0">
               <a:solidFill>
@@ -4622,19 +7397,101 @@
             <p:ph idx="1"/>
           </p:nvPr>
         </p:nvSpPr>
-        <p:spPr>
-          <a:xfrm>
-            <a:off x="1371600" y="2286000"/>
-            <a:ext cx="8674768" cy="3581400"/>
-          </a:xfrm>
-        </p:spPr>
+        <p:spPr/>
         <p:txBody>
           <a:bodyPr>
-            <a:normAutofit/>
+            <a:noAutofit/>
           </a:bodyPr>
           <a:lstStyle/>
           <a:p>
-            <a:endParaRPr lang="bg-BG" sz="3200" dirty="0">
+            <a:r>
+              <a:rPr lang="en-US" sz="3200" dirty="0" smtClean="0">
+                <a:solidFill>
+                  <a:schemeClr val="bg1"/>
+                </a:solidFill>
+              </a:rPr>
+              <a:t>Open source</a:t>
+            </a:r>
+          </a:p>
+          <a:p>
+            <a:r>
+              <a:rPr lang="en-US" sz="3200" dirty="0" smtClean="0">
+                <a:solidFill>
+                  <a:schemeClr val="bg1"/>
+                </a:solidFill>
+              </a:rPr>
+              <a:t>Document oriented</a:t>
+            </a:r>
+          </a:p>
+          <a:p>
+            <a:r>
+              <a:rPr lang="en-US" sz="3200" dirty="0" smtClean="0">
+                <a:solidFill>
+                  <a:schemeClr val="bg1"/>
+                </a:solidFill>
+              </a:rPr>
+              <a:t>Non-relational &amp; Schema-less</a:t>
+            </a:r>
+          </a:p>
+          <a:p>
+            <a:r>
+              <a:rPr lang="en-US" sz="3200" dirty="0" smtClean="0">
+                <a:solidFill>
+                  <a:schemeClr val="bg1"/>
+                </a:solidFill>
+              </a:rPr>
+              <a:t>Scalable</a:t>
+            </a:r>
+          </a:p>
+          <a:p>
+            <a:r>
+              <a:rPr lang="en-US" sz="3200" dirty="0" smtClean="0">
+                <a:solidFill>
+                  <a:schemeClr val="bg1"/>
+                </a:solidFill>
+              </a:rPr>
+              <a:t>High performance</a:t>
+            </a:r>
+          </a:p>
+          <a:p>
+            <a:r>
+              <a:rPr lang="en-US" sz="3200" dirty="0" smtClean="0">
+                <a:solidFill>
+                  <a:schemeClr val="bg1"/>
+                </a:solidFill>
+              </a:rPr>
+              <a:t>Full featured					</a:t>
+            </a:r>
+          </a:p>
+          <a:p>
+            <a:pPr marL="3730752" lvl="8" indent="0">
+              <a:buNone/>
+            </a:pPr>
+            <a:r>
+              <a:rPr lang="en-US" sz="3200" dirty="0">
+                <a:solidFill>
+                  <a:schemeClr val="bg1"/>
+                </a:solidFill>
+              </a:rPr>
+              <a:t>	</a:t>
+            </a:r>
+            <a:r>
+              <a:rPr lang="en-US" sz="3200" dirty="0" smtClean="0">
+                <a:solidFill>
+                  <a:schemeClr val="bg1"/>
+                </a:solidFill>
+              </a:rPr>
+              <a:t>		</a:t>
+            </a:r>
+            <a:r>
+              <a:rPr lang="en-US" sz="3200" u="sng" dirty="0" smtClean="0">
+                <a:solidFill>
+                  <a:schemeClr val="bg1"/>
+                </a:solidFill>
+              </a:rPr>
+              <a:t>… database</a:t>
+            </a:r>
+            <a:endParaRPr lang="bg-BG" sz="3200" u="sng" dirty="0">
               <a:solidFill>
                 <a:schemeClr val="bg1"/>
               </a:solidFill>
@@ -4645,17 +7502,24 @@
     </p:spTree>
     <p:extLst>
       <p:ext uri="{BB962C8B-B14F-4D97-AF65-F5344CB8AC3E}">
-        <p14:creationId xmlns:p14="http://schemas.microsoft.com/office/powerpoint/2010/main" val="1869702916"/>
+        <p14:creationId xmlns:p14="http://schemas.microsoft.com/office/powerpoint/2010/main" val="2243125812"/>
       </p:ext>
     </p:extLst>
   </p:cSld>
   <p:clrMapOvr>
     <a:masterClrMapping/>
   </p:clrMapOvr>
+  <p:timing>
+    <p:tnLst>
+      <p:par>
+        <p:cTn id="1" dur="indefinite" restart="never" nodeType="tmRoot"/>
+      </p:par>
+    </p:tnLst>
+  </p:timing>
 </p:sld>
 </file>
 
-<file path=ppt/slides/slide5.xml><?xml version="1.0" encoding="utf-8"?>
+<file path=ppt/slides/slide8.xml><?xml version="1.0" encoding="utf-8"?>
 <p:sld xmlns:a="http://schemas.openxmlformats.org/drawingml/2006/main" xmlns:r="http://schemas.openxmlformats.org/officeDocument/2006/relationships" xmlns:p="http://schemas.openxmlformats.org/presentationml/2006/main">
   <p:cSld>
     <p:spTree>
@@ -4687,7 +7551,11 @@
           <a:bodyPr/>
           <a:lstStyle/>
           <a:p>
-            <a:endParaRPr lang="bg-BG" dirty="0"/>
+            <a:r>
+              <a:rPr lang="en-US" b="1" u="sng" dirty="0" smtClean="0"/>
+              <a:t>Open source</a:t>
+            </a:r>
+            <a:endParaRPr lang="bg-BG" b="1" u="sng" dirty="0"/>
           </a:p>
         </p:txBody>
       </p:sp>
@@ -4703,47 +7571,227 @@
         </p:nvSpPr>
         <p:spPr/>
         <p:txBody>
-          <a:bodyPr/>
-          <a:lstStyle/>
-          <a:p>
-            <a:endParaRPr lang="bg-BG"/>
-          </a:p>
-        </p:txBody>
-      </p:sp>
-      <p:pic>
-        <p:nvPicPr>
-          <p:cNvPr id="4" name="Content Placeholder 5"/>
-          <p:cNvPicPr>
-            <a:picLocks noChangeAspect="1"/>
-          </p:cNvPicPr>
-          <p:nvPr/>
-        </p:nvPicPr>
-        <p:blipFill>
-          <a:blip r:embed="rId2"/>
-          <a:stretch>
-            <a:fillRect/>
-          </a:stretch>
-        </p:blipFill>
-        <p:spPr>
-          <a:xfrm>
-            <a:off x="11078383" y="91119"/>
-            <a:ext cx="886383" cy="1497651"/>
-          </a:xfrm>
-          <a:prstGeom prst="rect">
-            <a:avLst/>
-          </a:prstGeom>
-        </p:spPr>
-      </p:pic>
+          <a:bodyPr>
+            <a:noAutofit/>
+          </a:bodyPr>
+          <a:lstStyle/>
+          <a:p>
+            <a:r>
+              <a:rPr lang="en-US" sz="3200" dirty="0" smtClean="0"/>
+              <a:t>Source and supported drivers are open source and hosted at </a:t>
+            </a:r>
+            <a:r>
+              <a:rPr lang="en-US" sz="3200" dirty="0" err="1" smtClean="0"/>
+              <a:t>Github</a:t>
+            </a:r>
+            <a:r>
+              <a:rPr lang="en-US" sz="3200" dirty="0" smtClean="0"/>
+              <a:t>:</a:t>
+            </a:r>
+          </a:p>
+          <a:p>
+            <a:pPr lvl="1"/>
+            <a:r>
+              <a:rPr lang="en-US" sz="3200" dirty="0" smtClean="0"/>
+              <a:t>https://github.com/mongodb</a:t>
+            </a:r>
+            <a:endParaRPr lang="bg-BG" sz="3200" dirty="0"/>
+          </a:p>
+        </p:txBody>
+      </p:sp>
     </p:spTree>
     <p:extLst>
       <p:ext uri="{BB962C8B-B14F-4D97-AF65-F5344CB8AC3E}">
-        <p14:creationId xmlns:p14="http://schemas.microsoft.com/office/powerpoint/2010/main" val="326217632"/>
+        <p14:creationId xmlns:p14="http://schemas.microsoft.com/office/powerpoint/2010/main" val="1697882659"/>
       </p:ext>
     </p:extLst>
   </p:cSld>
   <p:clrMapOvr>
     <a:masterClrMapping/>
   </p:clrMapOvr>
+  <p:timing>
+    <p:tnLst>
+      <p:par>
+        <p:cTn id="1" dur="indefinite" restart="never" nodeType="tmRoot"/>
+      </p:par>
+    </p:tnLst>
+  </p:timing>
+</p:sld>
+</file>
+
+<file path=ppt/slides/slide9.xml><?xml version="1.0" encoding="utf-8"?>
+<p:sld xmlns:a="http://schemas.openxmlformats.org/drawingml/2006/main" xmlns:r="http://schemas.openxmlformats.org/officeDocument/2006/relationships" xmlns:p="http://schemas.openxmlformats.org/presentationml/2006/main">
+  <p:cSld>
+    <p:spTree>
+      <p:nvGrpSpPr>
+        <p:cNvPr id="1" name=""/>
+        <p:cNvGrpSpPr/>
+        <p:nvPr/>
+      </p:nvGrpSpPr>
+      <p:grpSpPr>
+        <a:xfrm>
+          <a:off x="0" y="0"/>
+          <a:ext cx="0" cy="0"/>
+          <a:chOff x="0" y="0"/>
+          <a:chExt cx="0" cy="0"/>
+        </a:xfrm>
+      </p:grpSpPr>
+      <p:sp>
+        <p:nvSpPr>
+          <p:cNvPr id="2" name="Title 1"/>
+          <p:cNvSpPr>
+            <a:spLocks noGrp="1"/>
+          </p:cNvSpPr>
+          <p:nvPr>
+            <p:ph type="title"/>
+          </p:nvPr>
+        </p:nvSpPr>
+        <p:spPr/>
+        <p:txBody>
+          <a:bodyPr/>
+          <a:lstStyle/>
+          <a:p>
+            <a:r>
+              <a:rPr lang="en-US" b="1" u="sng" dirty="0"/>
+              <a:t>Languages compatibility</a:t>
+            </a:r>
+            <a:endParaRPr lang="bg-BG" b="1" u="sng" dirty="0"/>
+          </a:p>
+        </p:txBody>
+      </p:sp>
+      <p:sp>
+        <p:nvSpPr>
+          <p:cNvPr id="3" name="Content Placeholder 2"/>
+          <p:cNvSpPr>
+            <a:spLocks noGrp="1"/>
+          </p:cNvSpPr>
+          <p:nvPr>
+            <p:ph sz="half" idx="1"/>
+          </p:nvPr>
+        </p:nvSpPr>
+        <p:spPr/>
+        <p:txBody>
+          <a:bodyPr>
+            <a:noAutofit/>
+          </a:bodyPr>
+          <a:lstStyle/>
+          <a:p>
+            <a:r>
+              <a:rPr lang="en-US" sz="3200" dirty="0" smtClean="0"/>
+              <a:t>C</a:t>
+            </a:r>
+          </a:p>
+          <a:p>
+            <a:r>
+              <a:rPr lang="en-US" sz="3200" dirty="0" smtClean="0"/>
+              <a:t>C++</a:t>
+            </a:r>
+          </a:p>
+          <a:p>
+            <a:r>
+              <a:rPr lang="en-US" sz="3200" dirty="0" smtClean="0"/>
+              <a:t>C#</a:t>
+            </a:r>
+          </a:p>
+          <a:p>
+            <a:r>
+              <a:rPr lang="en-US" sz="3200" dirty="0" smtClean="0"/>
+              <a:t>Java</a:t>
+            </a:r>
+          </a:p>
+          <a:p>
+            <a:r>
+              <a:rPr lang="en-US" sz="3200" dirty="0" smtClean="0"/>
+              <a:t>Perl</a:t>
+            </a:r>
+          </a:p>
+          <a:p>
+            <a:r>
+              <a:rPr lang="en-US" sz="3200" dirty="0" smtClean="0"/>
+              <a:t>PHP</a:t>
+            </a:r>
+          </a:p>
+          <a:p>
+            <a:r>
+              <a:rPr lang="en-US" sz="3200" dirty="0" err="1" smtClean="0"/>
+              <a:t>Erlang</a:t>
+            </a:r>
+            <a:endParaRPr lang="bg-BG" sz="3200" dirty="0"/>
+          </a:p>
+        </p:txBody>
+      </p:sp>
+      <p:sp>
+        <p:nvSpPr>
+          <p:cNvPr id="4" name="Content Placeholder 3"/>
+          <p:cNvSpPr>
+            <a:spLocks noGrp="1"/>
+          </p:cNvSpPr>
+          <p:nvPr>
+            <p:ph sz="half" idx="2"/>
+          </p:nvPr>
+        </p:nvSpPr>
+        <p:spPr/>
+        <p:txBody>
+          <a:bodyPr>
+            <a:noAutofit/>
+          </a:bodyPr>
+          <a:lstStyle/>
+          <a:p>
+            <a:r>
+              <a:rPr lang="en-US" sz="3200" dirty="0" smtClean="0"/>
+              <a:t>Python</a:t>
+            </a:r>
+          </a:p>
+          <a:p>
+            <a:r>
+              <a:rPr lang="en-US" sz="3200" dirty="0" smtClean="0"/>
+              <a:t>Motor</a:t>
+            </a:r>
+          </a:p>
+          <a:p>
+            <a:r>
+              <a:rPr lang="en-US" sz="3200" dirty="0" smtClean="0"/>
+              <a:t>Ruby</a:t>
+            </a:r>
+          </a:p>
+          <a:p>
+            <a:r>
+              <a:rPr lang="en-US" sz="3200" dirty="0" smtClean="0"/>
+              <a:t>Scala</a:t>
+            </a:r>
+          </a:p>
+          <a:p>
+            <a:r>
+              <a:rPr lang="en-US" sz="3200" dirty="0" smtClean="0"/>
+              <a:t>Go</a:t>
+            </a:r>
+          </a:p>
+          <a:p>
+            <a:r>
+              <a:rPr lang="en-US" sz="3200" dirty="0" err="1" smtClean="0"/>
+              <a:t>NodeJS</a:t>
+            </a:r>
+            <a:endParaRPr lang="en-US" sz="3200" dirty="0" smtClean="0"/>
+          </a:p>
+        </p:txBody>
+      </p:sp>
+    </p:spTree>
+    <p:extLst>
+      <p:ext uri="{BB962C8B-B14F-4D97-AF65-F5344CB8AC3E}">
+        <p14:creationId xmlns:p14="http://schemas.microsoft.com/office/powerpoint/2010/main" val="1929148224"/>
+      </p:ext>
+    </p:extLst>
+  </p:cSld>
+  <p:clrMapOvr>
+    <a:masterClrMapping/>
+  </p:clrMapOvr>
+  <p:timing>
+    <p:tnLst>
+      <p:par>
+        <p:cTn id="1" dur="indefinite" restart="never" nodeType="tmRoot"/>
+      </p:par>
+    </p:tnLst>
+  </p:timing>
 </p:sld>
 </file>
 

</xml_diff>

<commit_message>
add one more ex
</commit_message>
<xml_diff>
--- a/presentations/mongoDB.pptx
+++ b/presentations/mongoDB.pptx
@@ -30,16 +30,16 @@
   <p:notesSz cx="6858000" cy="9144000"/>
   <p:embeddedFontLst>
     <p:embeddedFont>
-      <p:font typeface="Franklin Gothic Book" panose="020B0503020102020204" pitchFamily="34" charset="0"/>
+      <p:font typeface="Calibri" panose="020F0502020204030204" pitchFamily="34" charset="0"/>
       <p:regular r:id="rId20"/>
-      <p:italic r:id="rId21"/>
+      <p:bold r:id="rId21"/>
+      <p:italic r:id="rId22"/>
+      <p:boldItalic r:id="rId23"/>
     </p:embeddedFont>
     <p:embeddedFont>
-      <p:font typeface="Calibri" panose="020F0502020204030204" pitchFamily="34" charset="0"/>
-      <p:regular r:id="rId22"/>
-      <p:bold r:id="rId23"/>
-      <p:italic r:id="rId24"/>
-      <p:boldItalic r:id="rId25"/>
+      <p:font typeface="Franklin Gothic Book" panose="020B0604020202020204" charset="0"/>
+      <p:regular r:id="rId24"/>
+      <p:italic r:id="rId25"/>
     </p:embeddedFont>
   </p:embeddedFontLst>
   <p:defaultTextStyle>
@@ -227,7 +227,7 @@
           <a:p>
             <a:fld id="{40C9EC12-D619-4239-BA0B-F64B757C48A8}" type="datetimeFigureOut">
               <a:rPr lang="bg-BG" smtClean="0"/>
-              <a:t>19.3.2017 г.</a:t>
+              <a:t>21.3.2017 г.</a:t>
             </a:fld>
             <a:endParaRPr lang="bg-BG"/>
           </a:p>
@@ -905,7 +905,7 @@
             <a:fld id="{87DE6118-2437-4B30-8E3C-4D2BE6020583}" type="datetimeFigureOut">
               <a:rPr lang="en-US" smtClean="0"/>
               <a:pPr/>
-              <a:t>3/19/2017</a:t>
+              <a:t>3/21/2017</a:t>
             </a:fld>
             <a:endParaRPr lang="en-US" dirty="0"/>
           </a:p>
@@ -1236,7 +1236,7 @@
           <a:p>
             <a:fld id="{87DE6118-2437-4B30-8E3C-4D2BE6020583}" type="datetimeFigureOut">
               <a:rPr lang="en-US" smtClean="0"/>
-              <a:t>3/19/2017</a:t>
+              <a:t>3/21/2017</a:t>
             </a:fld>
             <a:endParaRPr lang="en-US" dirty="0"/>
           </a:p>
@@ -1416,7 +1416,7 @@
           <a:p>
             <a:fld id="{87DE6118-2437-4B30-8E3C-4D2BE6020583}" type="datetimeFigureOut">
               <a:rPr lang="en-US" smtClean="0"/>
-              <a:t>3/19/2017</a:t>
+              <a:t>3/21/2017</a:t>
             </a:fld>
             <a:endParaRPr lang="en-US" dirty="0"/>
           </a:p>
@@ -1586,7 +1586,7 @@
           <a:p>
             <a:fld id="{87DE6118-2437-4B30-8E3C-4D2BE6020583}" type="datetimeFigureOut">
               <a:rPr lang="en-US" smtClean="0"/>
-              <a:t>3/19/2017</a:t>
+              <a:t>3/21/2017</a:t>
             </a:fld>
             <a:endParaRPr lang="en-US" dirty="0"/>
           </a:p>
@@ -1870,7 +1870,7 @@
             <a:fld id="{87DE6118-2437-4B30-8E3C-4D2BE6020583}" type="datetimeFigureOut">
               <a:rPr lang="en-US" smtClean="0"/>
               <a:pPr/>
-              <a:t>3/19/2017</a:t>
+              <a:t>3/21/2017</a:t>
             </a:fld>
             <a:endParaRPr lang="en-US" dirty="0"/>
           </a:p>
@@ -2265,7 +2265,7 @@
           <a:p>
             <a:fld id="{87DE6118-2437-4B30-8E3C-4D2BE6020583}" type="datetimeFigureOut">
               <a:rPr lang="en-US" smtClean="0"/>
-              <a:t>3/19/2017</a:t>
+              <a:t>3/21/2017</a:t>
             </a:fld>
             <a:endParaRPr lang="en-US" dirty="0"/>
           </a:p>
@@ -2742,7 +2742,7 @@
           <a:p>
             <a:fld id="{87DE6118-2437-4B30-8E3C-4D2BE6020583}" type="datetimeFigureOut">
               <a:rPr lang="en-US" smtClean="0"/>
-              <a:t>3/19/2017</a:t>
+              <a:t>3/21/2017</a:t>
             </a:fld>
             <a:endParaRPr lang="en-US" dirty="0"/>
           </a:p>
@@ -2860,7 +2860,7 @@
           <a:p>
             <a:fld id="{87DE6118-2437-4B30-8E3C-4D2BE6020583}" type="datetimeFigureOut">
               <a:rPr lang="en-US" smtClean="0"/>
-              <a:t>3/19/2017</a:t>
+              <a:t>3/21/2017</a:t>
             </a:fld>
             <a:endParaRPr lang="en-US" dirty="0"/>
           </a:p>
@@ -2955,7 +2955,7 @@
           <a:p>
             <a:fld id="{87DE6118-2437-4B30-8E3C-4D2BE6020583}" type="datetimeFigureOut">
               <a:rPr lang="en-US" smtClean="0"/>
-              <a:t>3/19/2017</a:t>
+              <a:t>3/21/2017</a:t>
             </a:fld>
             <a:endParaRPr lang="en-US" dirty="0"/>
           </a:p>
@@ -3302,7 +3302,7 @@
             <a:fld id="{87DE6118-2437-4B30-8E3C-4D2BE6020583}" type="datetimeFigureOut">
               <a:rPr lang="en-US" smtClean="0"/>
               <a:pPr/>
-              <a:t>3/19/2017</a:t>
+              <a:t>3/21/2017</a:t>
             </a:fld>
             <a:endParaRPr lang="en-US" dirty="0"/>
           </a:p>
@@ -3692,7 +3692,7 @@
             <a:fld id="{87DE6118-2437-4B30-8E3C-4D2BE6020583}" type="datetimeFigureOut">
               <a:rPr lang="en-US" smtClean="0"/>
               <a:pPr/>
-              <a:t>3/19/2017</a:t>
+              <a:t>3/21/2017</a:t>
             </a:fld>
             <a:endParaRPr lang="en-US" dirty="0"/>
           </a:p>
@@ -3972,7 +3972,7 @@
             <a:fld id="{87DE6118-2437-4B30-8E3C-4D2BE6020583}" type="datetimeFigureOut">
               <a:rPr lang="en-US" smtClean="0"/>
               <a:pPr/>
-              <a:t>3/19/2017</a:t>
+              <a:t>3/21/2017</a:t>
             </a:fld>
             <a:endParaRPr lang="en-US" dirty="0"/>
           </a:p>
@@ -6637,7 +6637,7 @@
           <a:lstStyle/>
           <a:p>
             <a:r>
-              <a:rPr lang="en-US" dirty="0"/>
+              <a:rPr lang="en-US" smtClean="0"/>
               <a:t>ex6</a:t>
             </a:r>
             <a:endParaRPr lang="bg-BG" dirty="0"/>

</xml_diff>